<commit_message>
Addressed the issue with the corruption in the presentation
</commit_message>
<xml_diff>
--- a/presentation/BDD_in_javascript_with_Jasmine.pptx
+++ b/presentation/BDD_in_javascript_with_Jasmine.pptx
@@ -1,45 +1,134 @@
 
-<file path=ppt/presentation1.xml><?xml version="1.0" encoding="utf-8"?>
-<p:presentation xmlns:p="http://schemas.openxmlformats.org/presentationml/2006/main" xmlns:a="http://schemas.openxmlformats.org/drawingml/2006/main" xmlns:r="http://schemas.openxmlformats.org/officeDocument/2006/relationships">
+<file path=ppt/presentation.xml><?xml version="1.0" encoding="utf-8"?>
+<p:presentation xmlns:a="http://schemas.openxmlformats.org/drawingml/2006/main" xmlns:r="http://schemas.openxmlformats.org/officeDocument/2006/relationships" xmlns:p="http://schemas.openxmlformats.org/presentationml/2006/main">
   <p:sldMasterIdLst>
-    <p:sldMasterId id="2147483648" r:id="rId2"/>
+    <p:sldMasterId id="2147483648" r:id="rId1"/>
   </p:sldMasterIdLst>
   <p:notesMasterIdLst>
-    <p:notesMasterId r:id="rId3"/>
+    <p:notesMasterId r:id="rId11"/>
   </p:notesMasterIdLst>
   <p:sldIdLst>
-    <p:sldId id="256" r:id="rId4"/>
-    <p:sldId id="257" r:id="rId5"/>
-    <p:sldId id="258" r:id="rId6"/>
-    <p:sldId id="259" r:id="rId7"/>
-    <p:sldId id="260" r:id="rId8"/>
-    <p:sldId id="261" r:id="rId9"/>
-    <p:sldId id="262" r:id="rId10"/>
-    <p:sldId id="263" r:id="rId11"/>
-    <p:sldId id="264" r:id="rId12"/>
+    <p:sldId id="256" r:id="rId2"/>
+    <p:sldId id="257" r:id="rId3"/>
+    <p:sldId id="258" r:id="rId4"/>
+    <p:sldId id="259" r:id="rId5"/>
+    <p:sldId id="260" r:id="rId6"/>
+    <p:sldId id="261" r:id="rId7"/>
+    <p:sldId id="262" r:id="rId8"/>
+    <p:sldId id="263" r:id="rId9"/>
+    <p:sldId id="264" r:id="rId10"/>
   </p:sldIdLst>
   <p:sldSz cx="7620000" cy="5715000"/>
   <p:notesSz cx="7620000" cy="5715000"/>
+  <p:defaultTextStyle>
+    <a:defPPr>
+      <a:defRPr lang="en-US"/>
+    </a:defPPr>
+    <a:lvl1pPr marL="0" algn="l" defTabSz="914400" rtl="0" eaLnBrk="1" latinLnBrk="0" hangingPunct="1">
+      <a:defRPr sz="1800" kern="1200">
+        <a:solidFill>
+          <a:schemeClr val="tx1"/>
+        </a:solidFill>
+        <a:latin typeface="+mn-lt"/>
+        <a:ea typeface="+mn-ea"/>
+        <a:cs typeface="+mn-cs"/>
+      </a:defRPr>
+    </a:lvl1pPr>
+    <a:lvl2pPr marL="457200" algn="l" defTabSz="914400" rtl="0" eaLnBrk="1" latinLnBrk="0" hangingPunct="1">
+      <a:defRPr sz="1800" kern="1200">
+        <a:solidFill>
+          <a:schemeClr val="tx1"/>
+        </a:solidFill>
+        <a:latin typeface="+mn-lt"/>
+        <a:ea typeface="+mn-ea"/>
+        <a:cs typeface="+mn-cs"/>
+      </a:defRPr>
+    </a:lvl2pPr>
+    <a:lvl3pPr marL="914400" algn="l" defTabSz="914400" rtl="0" eaLnBrk="1" latinLnBrk="0" hangingPunct="1">
+      <a:defRPr sz="1800" kern="1200">
+        <a:solidFill>
+          <a:schemeClr val="tx1"/>
+        </a:solidFill>
+        <a:latin typeface="+mn-lt"/>
+        <a:ea typeface="+mn-ea"/>
+        <a:cs typeface="+mn-cs"/>
+      </a:defRPr>
+    </a:lvl3pPr>
+    <a:lvl4pPr marL="1371600" algn="l" defTabSz="914400" rtl="0" eaLnBrk="1" latinLnBrk="0" hangingPunct="1">
+      <a:defRPr sz="1800" kern="1200">
+        <a:solidFill>
+          <a:schemeClr val="tx1"/>
+        </a:solidFill>
+        <a:latin typeface="+mn-lt"/>
+        <a:ea typeface="+mn-ea"/>
+        <a:cs typeface="+mn-cs"/>
+      </a:defRPr>
+    </a:lvl4pPr>
+    <a:lvl5pPr marL="1828800" algn="l" defTabSz="914400" rtl="0" eaLnBrk="1" latinLnBrk="0" hangingPunct="1">
+      <a:defRPr sz="1800" kern="1200">
+        <a:solidFill>
+          <a:schemeClr val="tx1"/>
+        </a:solidFill>
+        <a:latin typeface="+mn-lt"/>
+        <a:ea typeface="+mn-ea"/>
+        <a:cs typeface="+mn-cs"/>
+      </a:defRPr>
+    </a:lvl5pPr>
+    <a:lvl6pPr marL="2286000" algn="l" defTabSz="914400" rtl="0" eaLnBrk="1" latinLnBrk="0" hangingPunct="1">
+      <a:defRPr sz="1800" kern="1200">
+        <a:solidFill>
+          <a:schemeClr val="tx1"/>
+        </a:solidFill>
+        <a:latin typeface="+mn-lt"/>
+        <a:ea typeface="+mn-ea"/>
+        <a:cs typeface="+mn-cs"/>
+      </a:defRPr>
+    </a:lvl6pPr>
+    <a:lvl7pPr marL="2743200" algn="l" defTabSz="914400" rtl="0" eaLnBrk="1" latinLnBrk="0" hangingPunct="1">
+      <a:defRPr sz="1800" kern="1200">
+        <a:solidFill>
+          <a:schemeClr val="tx1"/>
+        </a:solidFill>
+        <a:latin typeface="+mn-lt"/>
+        <a:ea typeface="+mn-ea"/>
+        <a:cs typeface="+mn-cs"/>
+      </a:defRPr>
+    </a:lvl7pPr>
+    <a:lvl8pPr marL="3200400" algn="l" defTabSz="914400" rtl="0" eaLnBrk="1" latinLnBrk="0" hangingPunct="1">
+      <a:defRPr sz="1800" kern="1200">
+        <a:solidFill>
+          <a:schemeClr val="tx1"/>
+        </a:solidFill>
+        <a:latin typeface="+mn-lt"/>
+        <a:ea typeface="+mn-ea"/>
+        <a:cs typeface="+mn-cs"/>
+      </a:defRPr>
+    </a:lvl8pPr>
+    <a:lvl9pPr marL="3657600" algn="l" defTabSz="914400" rtl="0" eaLnBrk="1" latinLnBrk="0" hangingPunct="1">
+      <a:defRPr sz="1800" kern="1200">
+        <a:solidFill>
+          <a:schemeClr val="tx1"/>
+        </a:solidFill>
+        <a:latin typeface="+mn-lt"/>
+        <a:ea typeface="+mn-ea"/>
+        <a:cs typeface="+mn-cs"/>
+      </a:defRPr>
+    </a:lvl9pPr>
+  </p:defaultTextStyle>
 </p:presentation>
 </file>
 
-<file path=ppt/docProps/core.xml><?xml version="1.0" encoding="utf-8"?>
-<cp:coreProperties xmlns:cp="http://schemas.openxmlformats.org/package/2006/metadata/core-properties" xmlns:dc="http://purl.org/dc/elements/1.1/" xmlns:dcmitype="http://purl.org/dc/dcmitype/" xmlns:dcterms="http://purl.org/dc/terms/" xmlns:xsi="http://www.w3.org/2001/XMLSchema-instance">
-  <dc:title>Presentation [Made with 280slides.com]</dc:title>
-  <dc:creator/>
-  <cp:lastModifiedBy/>
-  <cp:revision>1</cp:revision>
-  <dcterms:created xsi:type="dcterms:W3CDTF">2011-04-19T05:40:55Z</dcterms:created>
-  <dcterms:modified xsi:type="dcterms:W3CDTF">2011-04-19T05:40:55Z</dcterms:modified>
-</cp:coreProperties>
-</file>
-
-<file path=ppt/noteMasters/noteMaster1.xml><?xml version="1.0" encoding="utf-8"?>
-<p:notesMaster xmlns:p="http://schemas.openxmlformats.org/presentationml/2006/main" xmlns:a="http://schemas.openxmlformats.org/drawingml/2006/main" xmlns:r="http://schemas.openxmlformats.org/officeDocument/2006/relationships">
+<file path=ppt/notesMasters/notesMaster1.xml><?xml version="1.0" encoding="utf-8"?>
+<p:notesMaster xmlns:a="http://schemas.openxmlformats.org/drawingml/2006/main" xmlns:r="http://schemas.openxmlformats.org/officeDocument/2006/relationships" xmlns:p="http://schemas.openxmlformats.org/presentationml/2006/main">
   <p:cSld>
+    <p:bg>
+      <p:bgRef idx="1001">
+        <a:schemeClr val="bg1"/>
+      </p:bgRef>
+    </p:bg>
     <p:spTree>
       <p:nvGrpSpPr>
-        <p:cNvPr id="9" name="SlideBase 9"/>
+        <p:cNvPr id="1" name="SlideBase 9"/>
         <p:cNvGrpSpPr/>
         <p:nvPr/>
       </p:nvGrpSpPr>
@@ -54,7 +143,9 @@
       <p:sp>
         <p:nvSpPr>
           <p:cNvPr id="10" name="Shape 10"/>
-          <p:cNvSpPr/>
+          <p:cNvSpPr>
+            <a:spLocks noGrp="1"/>
+          </p:cNvSpPr>
           <p:nvPr>
             <p:ph type="body"/>
           </p:nvPr>
@@ -67,17 +158,114 @@
         </p:spPr>
       </p:sp>
     </p:spTree>
+    <p:extLst>
+      <p:ext uri="{BB962C8B-B14F-4D97-AF65-F5344CB8AC3E}">
+        <p14:creationId xmlns:p14="http://schemas.microsoft.com/office/powerpoint/2010/main" val="57673318"/>
+      </p:ext>
+    </p:extLst>
   </p:cSld>
-  <p:clrMap/>
+  <p:clrMap bg1="lt1" tx1="dk1" bg2="lt2" tx2="dk2" accent1="accent1" accent2="accent2" accent3="accent3" accent4="accent4" accent5="accent5" accent6="accent6" hlink="hlink" folHlink="folHlink"/>
+  <p:notesStyle>
+    <a:lvl1pPr marL="0" algn="l" defTabSz="914400" rtl="0" eaLnBrk="1" latinLnBrk="0" hangingPunct="1">
+      <a:defRPr sz="1200" kern="1200">
+        <a:solidFill>
+          <a:schemeClr val="tx1"/>
+        </a:solidFill>
+        <a:latin typeface="+mn-lt"/>
+        <a:ea typeface="+mn-ea"/>
+        <a:cs typeface="+mn-cs"/>
+      </a:defRPr>
+    </a:lvl1pPr>
+    <a:lvl2pPr marL="457200" algn="l" defTabSz="914400" rtl="0" eaLnBrk="1" latinLnBrk="0" hangingPunct="1">
+      <a:defRPr sz="1200" kern="1200">
+        <a:solidFill>
+          <a:schemeClr val="tx1"/>
+        </a:solidFill>
+        <a:latin typeface="+mn-lt"/>
+        <a:ea typeface="+mn-ea"/>
+        <a:cs typeface="+mn-cs"/>
+      </a:defRPr>
+    </a:lvl2pPr>
+    <a:lvl3pPr marL="914400" algn="l" defTabSz="914400" rtl="0" eaLnBrk="1" latinLnBrk="0" hangingPunct="1">
+      <a:defRPr sz="1200" kern="1200">
+        <a:solidFill>
+          <a:schemeClr val="tx1"/>
+        </a:solidFill>
+        <a:latin typeface="+mn-lt"/>
+        <a:ea typeface="+mn-ea"/>
+        <a:cs typeface="+mn-cs"/>
+      </a:defRPr>
+    </a:lvl3pPr>
+    <a:lvl4pPr marL="1371600" algn="l" defTabSz="914400" rtl="0" eaLnBrk="1" latinLnBrk="0" hangingPunct="1">
+      <a:defRPr sz="1200" kern="1200">
+        <a:solidFill>
+          <a:schemeClr val="tx1"/>
+        </a:solidFill>
+        <a:latin typeface="+mn-lt"/>
+        <a:ea typeface="+mn-ea"/>
+        <a:cs typeface="+mn-cs"/>
+      </a:defRPr>
+    </a:lvl4pPr>
+    <a:lvl5pPr marL="1828800" algn="l" defTabSz="914400" rtl="0" eaLnBrk="1" latinLnBrk="0" hangingPunct="1">
+      <a:defRPr sz="1200" kern="1200">
+        <a:solidFill>
+          <a:schemeClr val="tx1"/>
+        </a:solidFill>
+        <a:latin typeface="+mn-lt"/>
+        <a:ea typeface="+mn-ea"/>
+        <a:cs typeface="+mn-cs"/>
+      </a:defRPr>
+    </a:lvl5pPr>
+    <a:lvl6pPr marL="2286000" algn="l" defTabSz="914400" rtl="0" eaLnBrk="1" latinLnBrk="0" hangingPunct="1">
+      <a:defRPr sz="1200" kern="1200">
+        <a:solidFill>
+          <a:schemeClr val="tx1"/>
+        </a:solidFill>
+        <a:latin typeface="+mn-lt"/>
+        <a:ea typeface="+mn-ea"/>
+        <a:cs typeface="+mn-cs"/>
+      </a:defRPr>
+    </a:lvl6pPr>
+    <a:lvl7pPr marL="2743200" algn="l" defTabSz="914400" rtl="0" eaLnBrk="1" latinLnBrk="0" hangingPunct="1">
+      <a:defRPr sz="1200" kern="1200">
+        <a:solidFill>
+          <a:schemeClr val="tx1"/>
+        </a:solidFill>
+        <a:latin typeface="+mn-lt"/>
+        <a:ea typeface="+mn-ea"/>
+        <a:cs typeface="+mn-cs"/>
+      </a:defRPr>
+    </a:lvl7pPr>
+    <a:lvl8pPr marL="3200400" algn="l" defTabSz="914400" rtl="0" eaLnBrk="1" latinLnBrk="0" hangingPunct="1">
+      <a:defRPr sz="1200" kern="1200">
+        <a:solidFill>
+          <a:schemeClr val="tx1"/>
+        </a:solidFill>
+        <a:latin typeface="+mn-lt"/>
+        <a:ea typeface="+mn-ea"/>
+        <a:cs typeface="+mn-cs"/>
+      </a:defRPr>
+    </a:lvl8pPr>
+    <a:lvl9pPr marL="3657600" algn="l" defTabSz="914400" rtl="0" eaLnBrk="1" latinLnBrk="0" hangingPunct="1">
+      <a:defRPr sz="1200" kern="1200">
+        <a:solidFill>
+          <a:schemeClr val="tx1"/>
+        </a:solidFill>
+        <a:latin typeface="+mn-lt"/>
+        <a:ea typeface="+mn-ea"/>
+        <a:cs typeface="+mn-cs"/>
+      </a:defRPr>
+    </a:lvl9pPr>
+  </p:notesStyle>
 </p:notesMaster>
 </file>
 
 <file path=ppt/slideLayouts/slideLayout1.xml><?xml version="1.0" encoding="utf-8"?>
-<p:sldLayout xmlns:p="http://schemas.openxmlformats.org/presentationml/2006/main" xmlns:a="http://schemas.openxmlformats.org/drawingml/2006/main" xmlns:r="http://schemas.openxmlformats.org/officeDocument/2006/relationships" preserve="1" type="title">
+<p:sldLayout xmlns:a="http://schemas.openxmlformats.org/drawingml/2006/main" xmlns:r="http://schemas.openxmlformats.org/officeDocument/2006/relationships" xmlns:p="http://schemas.openxmlformats.org/presentationml/2006/main" type="title" preserve="1">
   <p:cSld name="Title Slide">
     <p:spTree>
       <p:nvGrpSpPr>
-        <p:cNvPr id="2" name="SlideBase 2"/>
+        <p:cNvPr id="1" name="SlideBase 2"/>
         <p:cNvGrpSpPr/>
         <p:nvPr/>
       </p:nvGrpSpPr>
@@ -92,9 +280,11 @@
       <p:sp>
         <p:nvSpPr>
           <p:cNvPr id="3" name="Shape 3"/>
-          <p:cNvSpPr/>
+          <p:cNvSpPr>
+            <a:spLocks noGrp="1"/>
+          </p:cNvSpPr>
           <p:nvPr>
-            <p:ph idx="0" type="title"/>
+            <p:ph type="title"/>
           </p:nvPr>
         </p:nvSpPr>
         <p:spPr>
@@ -102,25 +292,26 @@
             <a:off x="476250" y="1905000"/>
             <a:ext cx="6667500" cy="952500"/>
           </a:xfrm>
-          <a:prstGeom prst="rect"/>
+          <a:prstGeom prst="rect">
+            <a:avLst/>
+          </a:prstGeom>
         </p:spPr>
         <p:txBody>
           <a:bodyPr/>
-          <a:p>
-            <a:pPr/>
-            <a:r>
-              <a:rPr dirty="0" lang="en-US" smtClean="0"/>
-              <a:t/>
-            </a:r>
+          <a:lstStyle/>
+          <a:p>
+            <a:endParaRPr/>
           </a:p>
         </p:txBody>
       </p:sp>
       <p:sp>
         <p:nvSpPr>
           <p:cNvPr id="4" name="Shape 4"/>
-          <p:cNvSpPr/>
+          <p:cNvSpPr>
+            <a:spLocks noGrp="1"/>
+          </p:cNvSpPr>
           <p:nvPr>
-            <p:ph idx="1" type="subTitle"/>
+            <p:ph type="subTitle" idx="1"/>
           </p:nvPr>
         </p:nvSpPr>
         <p:spPr>
@@ -128,16 +319,15 @@
             <a:off x="857250" y="3095625"/>
             <a:ext cx="5905500" cy="1428750"/>
           </a:xfrm>
-          <a:prstGeom prst="rect"/>
+          <a:prstGeom prst="rect">
+            <a:avLst/>
+          </a:prstGeom>
         </p:spPr>
         <p:txBody>
           <a:bodyPr/>
-          <a:p>
-            <a:pPr/>
-            <a:r>
-              <a:rPr dirty="0" lang="en-US" smtClean="0"/>
-              <a:t/>
-            </a:r>
+          <a:lstStyle/>
+          <a:p>
+            <a:endParaRPr/>
           </a:p>
         </p:txBody>
       </p:sp>
@@ -150,11 +340,11 @@
 </file>
 
 <file path=ppt/slideLayouts/slideLayout2.xml><?xml version="1.0" encoding="utf-8"?>
-<p:sldLayout xmlns:p="http://schemas.openxmlformats.org/presentationml/2006/main" xmlns:a="http://schemas.openxmlformats.org/drawingml/2006/main" xmlns:r="http://schemas.openxmlformats.org/officeDocument/2006/relationships" preserve="1" type="obj">
+<p:sldLayout xmlns:a="http://schemas.openxmlformats.org/drawingml/2006/main" xmlns:r="http://schemas.openxmlformats.org/officeDocument/2006/relationships" xmlns:p="http://schemas.openxmlformats.org/presentationml/2006/main" type="obj" preserve="1">
   <p:cSld name="Title And Content">
     <p:spTree>
       <p:nvGrpSpPr>
-        <p:cNvPr id="5" name="SlideBase 5"/>
+        <p:cNvPr id="1" name="SlideBase 5"/>
         <p:cNvGrpSpPr/>
         <p:nvPr/>
       </p:nvGrpSpPr>
@@ -169,9 +359,11 @@
       <p:sp>
         <p:nvSpPr>
           <p:cNvPr id="6" name="Shape 6"/>
-          <p:cNvSpPr/>
+          <p:cNvSpPr>
+            <a:spLocks noGrp="1"/>
+          </p:cNvSpPr>
           <p:nvPr>
-            <p:ph idx="0" type="title"/>
+            <p:ph type="title"/>
           </p:nvPr>
         </p:nvSpPr>
         <p:spPr>
@@ -179,25 +371,26 @@
             <a:off x="238125" y="190500"/>
             <a:ext cx="7143750" cy="762000"/>
           </a:xfrm>
-          <a:prstGeom prst="rect"/>
+          <a:prstGeom prst="rect">
+            <a:avLst/>
+          </a:prstGeom>
         </p:spPr>
         <p:txBody>
           <a:bodyPr/>
-          <a:p>
-            <a:pPr/>
-            <a:r>
-              <a:rPr dirty="0" lang="en-US" smtClean="0"/>
-              <a:t/>
-            </a:r>
+          <a:lstStyle/>
+          <a:p>
+            <a:endParaRPr/>
           </a:p>
         </p:txBody>
       </p:sp>
       <p:sp>
         <p:nvSpPr>
           <p:cNvPr id="7" name="Shape 7"/>
-          <p:cNvSpPr/>
+          <p:cNvSpPr>
+            <a:spLocks noGrp="1"/>
+          </p:cNvSpPr>
           <p:nvPr>
-            <p:ph idx="2" type="body"/>
+            <p:ph type="body" idx="2"/>
           </p:nvPr>
         </p:nvSpPr>
         <p:spPr>
@@ -205,16 +398,15 @@
             <a:off x="238125" y="1143000"/>
             <a:ext cx="7143750" cy="4381500"/>
           </a:xfrm>
-          <a:prstGeom prst="rect"/>
+          <a:prstGeom prst="rect">
+            <a:avLst/>
+          </a:prstGeom>
         </p:spPr>
         <p:txBody>
           <a:bodyPr/>
-          <a:p>
-            <a:pPr/>
-            <a:r>
-              <a:rPr dirty="0" lang="en-US" smtClean="0"/>
-              <a:t/>
-            </a:r>
+          <a:lstStyle/>
+          <a:p>
+            <a:endParaRPr/>
           </a:p>
         </p:txBody>
       </p:sp>
@@ -227,11 +419,11 @@
 </file>
 
 <file path=ppt/slideLayouts/slideLayout3.xml><?xml version="1.0" encoding="utf-8"?>
-<p:sldLayout xmlns:p="http://schemas.openxmlformats.org/presentationml/2006/main" xmlns:a="http://schemas.openxmlformats.org/drawingml/2006/main" xmlns:r="http://schemas.openxmlformats.org/officeDocument/2006/relationships" preserve="1" type="blank">
+<p:sldLayout xmlns:a="http://schemas.openxmlformats.org/drawingml/2006/main" xmlns:r="http://schemas.openxmlformats.org/officeDocument/2006/relationships" xmlns:p="http://schemas.openxmlformats.org/presentationml/2006/main" type="blank" preserve="1">
   <p:cSld name="Blank">
     <p:spTree>
       <p:nvGrpSpPr>
-        <p:cNvPr id="8" name="SlideBase 8"/>
+        <p:cNvPr id="1" name="SlideBase 8"/>
         <p:cNvGrpSpPr/>
         <p:nvPr/>
       </p:nvGrpSpPr>
@@ -252,13 +444,14 @@
 </file>
 
 <file path=ppt/slideMasters/slideMaster1.xml><?xml version="1.0" encoding="utf-8"?>
-<p:sldMaster xmlns:p="http://schemas.openxmlformats.org/presentationml/2006/main" xmlns:a="http://schemas.openxmlformats.org/drawingml/2006/main" xmlns:r="http://schemas.openxmlformats.org/officeDocument/2006/relationships">
+<p:sldMaster xmlns:a="http://schemas.openxmlformats.org/drawingml/2006/main" xmlns:r="http://schemas.openxmlformats.org/officeDocument/2006/relationships" xmlns:p="http://schemas.openxmlformats.org/presentationml/2006/main">
   <p:cSld>
     <p:bg>
       <p:bgPr>
         <a:solidFill>
           <a:prstClr val="white"/>
         </a:solidFill>
+        <a:effectLst/>
       </p:bgPr>
     </p:bg>
     <p:spTree>
@@ -277,7 +470,7 @@
       </p:grpSpPr>
     </p:spTree>
   </p:cSld>
-  <p:clrMap accent1="accent1" accent2="accent2" accent3="accent3" accent4="accent4" accent5="accent5" accent6="accent6" bg1="lt1" bg2="lt2" folHlink="folHlink" hlink="hlink" tx1="dk1" tx2="dk2"/>
+  <p:clrMap bg1="lt1" tx1="dk1" bg2="lt2" tx2="dk2" accent1="accent1" accent2="accent2" accent3="accent3" accent4="accent4" accent5="accent5" accent6="accent6" hlink="hlink" folHlink="folHlink"/>
   <p:sldLayoutIdLst>
     <p:sldLayoutId id="2147483649" r:id="rId1"/>
     <p:sldLayoutId id="2147483650" r:id="rId2"/>
@@ -285,288 +478,288 @@
   </p:sldLayoutIdLst>
   <p:txStyles>
     <p:titleStyle>
-      <a:lvl1pPr algn="ctr" defTabSz="914400" eaLnBrk="1" hangingPunct="1" indent="0" latinLnBrk="0" rtl="0">
+      <a:lvl1pPr indent="0" algn="ctr" defTabSz="914400" rtl="0" eaLnBrk="1" latinLnBrk="0" hangingPunct="1">
         <a:spcBef>
           <a:spcPct val="0"/>
         </a:spcBef>
         <a:buNone/>
-        <a:defRPr b="0" i="0" kern="1200" sz="4800" u="none">
+        <a:defRPr sz="4800" b="0" i="0" u="none" kern="1200">
           <a:solidFill>
             <a:prstClr val="black"/>
           </a:solidFill>
-          <a:latin charset="0" pitchFamily="34" typeface="Arial"/>
+          <a:latin typeface="Arial" pitchFamily="34" charset="0"/>
           <a:ea typeface="+mj-ea"/>
           <a:cs typeface="+mj-cs"/>
         </a:defRPr>
       </a:lvl1pPr>
     </p:titleStyle>
     <p:bodyStyle>
-      <a:lvl1pPr algn="l" defTabSz="914400" eaLnBrk="1" hangingPunct="1" indent="0" latinLnBrk="0" marL="0" rtl="0">
+      <a:lvl1pPr marL="0" indent="0" algn="l" defTabSz="914400" rtl="0" eaLnBrk="1" latinLnBrk="0" hangingPunct="1">
         <a:spcBef>
           <a:spcPct val="0"/>
         </a:spcBef>
         <a:buNone/>
-        <a:defRPr b="0" i="0" kern="1200" sz="3200" u="none">
+        <a:defRPr sz="3200" b="0" i="0" u="none" kern="1200">
           <a:solidFill>
             <a:prstClr val="black"/>
           </a:solidFill>
-          <a:latin charset="0" pitchFamily="34" typeface="Arial"/>
+          <a:latin typeface="Arial" pitchFamily="34" charset="0"/>
           <a:ea typeface="+mj-ea"/>
           <a:cs typeface="+mj-cs"/>
         </a:defRPr>
       </a:lvl1pPr>
-      <a:lvl2pPr algn="l" defTabSz="914400" eaLnBrk="1" hangingPunct="1" indent="0" latinLnBrk="0" marL="457200" rtl="0">
+      <a:lvl2pPr marL="457200" indent="0" algn="l" defTabSz="914400" rtl="0" eaLnBrk="1" latinLnBrk="0" hangingPunct="1">
         <a:spcBef>
           <a:spcPct val="0"/>
         </a:spcBef>
-        <a:buFont charset="0" pitchFamily="34" typeface="Arial"/>
+        <a:buFont typeface="Arial" pitchFamily="34" charset="0"/>
         <a:buChar char="•"/>
-        <a:defRPr b="0" i="0" kern="1200" sz="3200" u="none">
+        <a:defRPr sz="3200" b="0" i="0" u="none" kern="1200">
           <a:solidFill>
             <a:prstClr val="black"/>
           </a:solidFill>
-          <a:latin charset="0" pitchFamily="34" typeface="Arial"/>
+          <a:latin typeface="Arial" pitchFamily="34" charset="0"/>
           <a:ea typeface="+mj-ea"/>
           <a:cs typeface="+mj-cs"/>
         </a:defRPr>
       </a:lvl2pPr>
-      <a:lvl3pPr algn="l" defTabSz="914400" eaLnBrk="1" hangingPunct="1" indent="0" latinLnBrk="0" marL="914400" rtl="0">
+      <a:lvl3pPr marL="914400" indent="0" algn="l" defTabSz="914400" rtl="0" eaLnBrk="1" latinLnBrk="0" hangingPunct="1">
         <a:spcBef>
           <a:spcPct val="0"/>
         </a:spcBef>
-        <a:buFont charset="0" pitchFamily="34" typeface="Arial"/>
+        <a:buFont typeface="Arial" pitchFamily="34" charset="0"/>
         <a:buChar char="•"/>
-        <a:defRPr b="0" i="0" kern="1200" sz="3200" u="none">
+        <a:defRPr sz="3200" b="0" i="0" u="none" kern="1200">
           <a:solidFill>
             <a:prstClr val="black"/>
           </a:solidFill>
-          <a:latin charset="0" pitchFamily="34" typeface="Arial"/>
+          <a:latin typeface="Arial" pitchFamily="34" charset="0"/>
           <a:ea typeface="+mj-ea"/>
           <a:cs typeface="+mj-cs"/>
         </a:defRPr>
       </a:lvl3pPr>
-      <a:lvl4pPr algn="l" defTabSz="914400" eaLnBrk="1" hangingPunct="1" indent="0" latinLnBrk="0" marL="1371600" rtl="0">
+      <a:lvl4pPr marL="1371600" indent="0" algn="l" defTabSz="914400" rtl="0" eaLnBrk="1" latinLnBrk="0" hangingPunct="1">
         <a:spcBef>
           <a:spcPct val="0"/>
         </a:spcBef>
-        <a:buFont charset="0" pitchFamily="34" typeface="Arial"/>
+        <a:buFont typeface="Arial" pitchFamily="34" charset="0"/>
         <a:buChar char="•"/>
-        <a:defRPr b="0" i="0" kern="1200" sz="3200" u="none">
+        <a:defRPr sz="3200" b="0" i="0" u="none" kern="1200">
           <a:solidFill>
             <a:prstClr val="black"/>
           </a:solidFill>
-          <a:latin charset="0" pitchFamily="34" typeface="Arial"/>
+          <a:latin typeface="Arial" pitchFamily="34" charset="0"/>
           <a:ea typeface="+mj-ea"/>
           <a:cs typeface="+mj-cs"/>
         </a:defRPr>
       </a:lvl4pPr>
-      <a:lvl5pPr algn="l" defTabSz="914400" eaLnBrk="1" hangingPunct="1" indent="0" latinLnBrk="0" marL="1828800" rtl="0">
+      <a:lvl5pPr marL="1828800" indent="0" algn="l" defTabSz="914400" rtl="0" eaLnBrk="1" latinLnBrk="0" hangingPunct="1">
         <a:spcBef>
           <a:spcPct val="0"/>
         </a:spcBef>
-        <a:buFont charset="0" pitchFamily="34" typeface="Arial"/>
+        <a:buFont typeface="Arial" pitchFamily="34" charset="0"/>
         <a:buChar char="•"/>
-        <a:defRPr b="0" i="0" kern="1200" sz="3200" u="none">
+        <a:defRPr sz="3200" b="0" i="0" u="none" kern="1200">
           <a:solidFill>
             <a:prstClr val="black"/>
           </a:solidFill>
-          <a:latin charset="0" pitchFamily="34" typeface="Arial"/>
+          <a:latin typeface="Arial" pitchFamily="34" charset="0"/>
           <a:ea typeface="+mj-ea"/>
           <a:cs typeface="+mj-cs"/>
         </a:defRPr>
       </a:lvl5pPr>
-      <a:lvl6pPr algn="l" defTabSz="914400" eaLnBrk="1" hangingPunct="1" indent="0" latinLnBrk="0" marL="2286000" rtl="0">
+      <a:lvl6pPr marL="2286000" indent="0" algn="l" defTabSz="914400" rtl="0" eaLnBrk="1" latinLnBrk="0" hangingPunct="1">
         <a:spcBef>
           <a:spcPct val="0"/>
         </a:spcBef>
-        <a:buFont charset="0" pitchFamily="34" typeface="Arial"/>
+        <a:buFont typeface="Arial" pitchFamily="34" charset="0"/>
         <a:buChar char="•"/>
-        <a:defRPr b="0" i="0" kern="1200" sz="3200" u="none">
+        <a:defRPr sz="3200" b="0" i="0" u="none" kern="1200">
           <a:solidFill>
             <a:prstClr val="black"/>
           </a:solidFill>
-          <a:latin charset="0" pitchFamily="34" typeface="Arial"/>
+          <a:latin typeface="Arial" pitchFamily="34" charset="0"/>
           <a:ea typeface="+mj-ea"/>
           <a:cs typeface="+mj-cs"/>
         </a:defRPr>
       </a:lvl6pPr>
-      <a:lvl7pPr algn="l" defTabSz="914400" eaLnBrk="1" hangingPunct="1" indent="0" latinLnBrk="0" marL="2743200" rtl="0">
+      <a:lvl7pPr marL="2743200" indent="0" algn="l" defTabSz="914400" rtl="0" eaLnBrk="1" latinLnBrk="0" hangingPunct="1">
         <a:spcBef>
           <a:spcPct val="0"/>
         </a:spcBef>
-        <a:buFont charset="0" pitchFamily="34" typeface="Arial"/>
+        <a:buFont typeface="Arial" pitchFamily="34" charset="0"/>
         <a:buChar char="•"/>
-        <a:defRPr b="0" i="0" kern="1200" sz="3200" u="none">
+        <a:defRPr sz="3200" b="0" i="0" u="none" kern="1200">
           <a:solidFill>
             <a:prstClr val="black"/>
           </a:solidFill>
-          <a:latin charset="0" pitchFamily="34" typeface="Arial"/>
+          <a:latin typeface="Arial" pitchFamily="34" charset="0"/>
           <a:ea typeface="+mj-ea"/>
           <a:cs typeface="+mj-cs"/>
         </a:defRPr>
       </a:lvl7pPr>
-      <a:lvl8pPr algn="l" defTabSz="914400" eaLnBrk="1" hangingPunct="1" indent="0" latinLnBrk="0" marL="3200400" rtl="0">
+      <a:lvl8pPr marL="3200400" indent="0" algn="l" defTabSz="914400" rtl="0" eaLnBrk="1" latinLnBrk="0" hangingPunct="1">
         <a:spcBef>
           <a:spcPct val="0"/>
         </a:spcBef>
-        <a:buFont charset="0" pitchFamily="34" typeface="Arial"/>
+        <a:buFont typeface="Arial" pitchFamily="34" charset="0"/>
         <a:buChar char="•"/>
-        <a:defRPr b="0" i="0" kern="1200" sz="3200" u="none">
+        <a:defRPr sz="3200" b="0" i="0" u="none" kern="1200">
           <a:solidFill>
             <a:prstClr val="black"/>
           </a:solidFill>
-          <a:latin charset="0" pitchFamily="34" typeface="Arial"/>
+          <a:latin typeface="Arial" pitchFamily="34" charset="0"/>
           <a:ea typeface="+mj-ea"/>
           <a:cs typeface="+mj-cs"/>
         </a:defRPr>
       </a:lvl8pPr>
-      <a:lvl9pPr algn="l" defTabSz="914400" eaLnBrk="1" hangingPunct="1" indent="0" latinLnBrk="0" marL="3657600" rtl="0">
+      <a:lvl9pPr marL="3657600" indent="0" algn="l" defTabSz="914400" rtl="0" eaLnBrk="1" latinLnBrk="0" hangingPunct="1">
         <a:spcBef>
           <a:spcPct val="0"/>
         </a:spcBef>
-        <a:buFont charset="0" pitchFamily="34" typeface="Arial"/>
+        <a:buFont typeface="Arial" pitchFamily="34" charset="0"/>
         <a:buChar char="•"/>
-        <a:defRPr b="0" i="0" kern="1200" sz="3200" u="none">
+        <a:defRPr sz="3200" b="0" i="0" u="none" kern="1200">
           <a:solidFill>
             <a:prstClr val="black"/>
           </a:solidFill>
-          <a:latin charset="0" pitchFamily="34" typeface="Arial"/>
+          <a:latin typeface="Arial" pitchFamily="34" charset="0"/>
           <a:ea typeface="+mj-ea"/>
           <a:cs typeface="+mj-cs"/>
         </a:defRPr>
       </a:lvl9pPr>
     </p:bodyStyle>
     <p:otherStyle>
-      <a:lvl1pPr algn="ctr" defTabSz="914400" eaLnBrk="1" hangingPunct="1" indent="0" latinLnBrk="0" marL="0" rtl="0">
+      <a:lvl1pPr marL="0" indent="0" algn="ctr" defTabSz="914400" rtl="0" eaLnBrk="1" latinLnBrk="0" hangingPunct="1">
         <a:spcBef>
           <a:spcPct val="0"/>
         </a:spcBef>
         <a:buNone/>
-        <a:defRPr b="0" i="0" kern="1200" sz="3200" u="none">
+        <a:defRPr sz="3200" b="0" i="0" u="none" kern="1200">
           <a:solidFill>
             <a:prstClr val="black"/>
           </a:solidFill>
-          <a:latin charset="0" pitchFamily="34" typeface="Arial"/>
+          <a:latin typeface="Arial" pitchFamily="34" charset="0"/>
           <a:ea typeface="+mj-ea"/>
           <a:cs typeface="+mj-cs"/>
         </a:defRPr>
       </a:lvl1pPr>
-      <a:lvl2pPr algn="ctr" defTabSz="914400" eaLnBrk="1" hangingPunct="1" indent="0" latinLnBrk="0" marL="457200" rtl="0">
+      <a:lvl2pPr marL="457200" indent="0" algn="ctr" defTabSz="914400" rtl="0" eaLnBrk="1" latinLnBrk="0" hangingPunct="1">
         <a:spcBef>
           <a:spcPct val="0"/>
         </a:spcBef>
-        <a:buFont charset="0" pitchFamily="34" typeface="Arial"/>
+        <a:buFont typeface="Arial" pitchFamily="34" charset="0"/>
         <a:buChar char="•"/>
-        <a:defRPr b="0" i="0" kern="1200" sz="3200" u="none">
+        <a:defRPr sz="3200" b="0" i="0" u="none" kern="1200">
           <a:solidFill>
             <a:prstClr val="black"/>
           </a:solidFill>
-          <a:latin charset="0" pitchFamily="34" typeface="Arial"/>
+          <a:latin typeface="Arial" pitchFamily="34" charset="0"/>
           <a:ea typeface="+mj-ea"/>
           <a:cs typeface="+mj-cs"/>
         </a:defRPr>
       </a:lvl2pPr>
-      <a:lvl3pPr algn="ctr" defTabSz="914400" eaLnBrk="1" hangingPunct="1" indent="0" latinLnBrk="0" marL="914400" rtl="0">
+      <a:lvl3pPr marL="914400" indent="0" algn="ctr" defTabSz="914400" rtl="0" eaLnBrk="1" latinLnBrk="0" hangingPunct="1">
         <a:spcBef>
           <a:spcPct val="0"/>
         </a:spcBef>
-        <a:buFont charset="0" pitchFamily="34" typeface="Arial"/>
+        <a:buFont typeface="Arial" pitchFamily="34" charset="0"/>
         <a:buChar char="•"/>
-        <a:defRPr b="0" i="0" kern="1200" sz="3200" u="none">
+        <a:defRPr sz="3200" b="0" i="0" u="none" kern="1200">
           <a:solidFill>
             <a:prstClr val="black"/>
           </a:solidFill>
-          <a:latin charset="0" pitchFamily="34" typeface="Arial"/>
+          <a:latin typeface="Arial" pitchFamily="34" charset="0"/>
           <a:ea typeface="+mj-ea"/>
           <a:cs typeface="+mj-cs"/>
         </a:defRPr>
       </a:lvl3pPr>
-      <a:lvl4pPr algn="ctr" defTabSz="914400" eaLnBrk="1" hangingPunct="1" indent="0" latinLnBrk="0" marL="1371600" rtl="0">
+      <a:lvl4pPr marL="1371600" indent="0" algn="ctr" defTabSz="914400" rtl="0" eaLnBrk="1" latinLnBrk="0" hangingPunct="1">
         <a:spcBef>
           <a:spcPct val="0"/>
         </a:spcBef>
-        <a:buFont charset="0" pitchFamily="34" typeface="Arial"/>
+        <a:buFont typeface="Arial" pitchFamily="34" charset="0"/>
         <a:buChar char="•"/>
-        <a:defRPr b="0" i="0" kern="1200" sz="3200" u="none">
+        <a:defRPr sz="3200" b="0" i="0" u="none" kern="1200">
           <a:solidFill>
             <a:prstClr val="black"/>
           </a:solidFill>
-          <a:latin charset="0" pitchFamily="34" typeface="Arial"/>
+          <a:latin typeface="Arial" pitchFamily="34" charset="0"/>
           <a:ea typeface="+mj-ea"/>
           <a:cs typeface="+mj-cs"/>
         </a:defRPr>
       </a:lvl4pPr>
-      <a:lvl5pPr algn="ctr" defTabSz="914400" eaLnBrk="1" hangingPunct="1" indent="0" latinLnBrk="0" marL="1828800" rtl="0">
+      <a:lvl5pPr marL="1828800" indent="0" algn="ctr" defTabSz="914400" rtl="0" eaLnBrk="1" latinLnBrk="0" hangingPunct="1">
         <a:spcBef>
           <a:spcPct val="0"/>
         </a:spcBef>
-        <a:buFont charset="0" pitchFamily="34" typeface="Arial"/>
+        <a:buFont typeface="Arial" pitchFamily="34" charset="0"/>
         <a:buChar char="•"/>
-        <a:defRPr b="0" i="0" kern="1200" sz="3200" u="none">
+        <a:defRPr sz="3200" b="0" i="0" u="none" kern="1200">
           <a:solidFill>
             <a:prstClr val="black"/>
           </a:solidFill>
-          <a:latin charset="0" pitchFamily="34" typeface="Arial"/>
+          <a:latin typeface="Arial" pitchFamily="34" charset="0"/>
           <a:ea typeface="+mj-ea"/>
           <a:cs typeface="+mj-cs"/>
         </a:defRPr>
       </a:lvl5pPr>
-      <a:lvl6pPr algn="ctr" defTabSz="914400" eaLnBrk="1" hangingPunct="1" indent="0" latinLnBrk="0" marL="2286000" rtl="0">
+      <a:lvl6pPr marL="2286000" indent="0" algn="ctr" defTabSz="914400" rtl="0" eaLnBrk="1" latinLnBrk="0" hangingPunct="1">
         <a:spcBef>
           <a:spcPct val="0"/>
         </a:spcBef>
-        <a:buFont charset="0" pitchFamily="34" typeface="Arial"/>
+        <a:buFont typeface="Arial" pitchFamily="34" charset="0"/>
         <a:buChar char="•"/>
-        <a:defRPr b="0" i="0" kern="1200" sz="3200" u="none">
+        <a:defRPr sz="3200" b="0" i="0" u="none" kern="1200">
           <a:solidFill>
             <a:prstClr val="black"/>
           </a:solidFill>
-          <a:latin charset="0" pitchFamily="34" typeface="Arial"/>
+          <a:latin typeface="Arial" pitchFamily="34" charset="0"/>
           <a:ea typeface="+mj-ea"/>
           <a:cs typeface="+mj-cs"/>
         </a:defRPr>
       </a:lvl6pPr>
-      <a:lvl7pPr algn="ctr" defTabSz="914400" eaLnBrk="1" hangingPunct="1" indent="0" latinLnBrk="0" marL="2743200" rtl="0">
+      <a:lvl7pPr marL="2743200" indent="0" algn="ctr" defTabSz="914400" rtl="0" eaLnBrk="1" latinLnBrk="0" hangingPunct="1">
         <a:spcBef>
           <a:spcPct val="0"/>
         </a:spcBef>
-        <a:buFont charset="0" pitchFamily="34" typeface="Arial"/>
+        <a:buFont typeface="Arial" pitchFamily="34" charset="0"/>
         <a:buChar char="•"/>
-        <a:defRPr b="0" i="0" kern="1200" sz="3200" u="none">
+        <a:defRPr sz="3200" b="0" i="0" u="none" kern="1200">
           <a:solidFill>
             <a:prstClr val="black"/>
           </a:solidFill>
-          <a:latin charset="0" pitchFamily="34" typeface="Arial"/>
+          <a:latin typeface="Arial" pitchFamily="34" charset="0"/>
           <a:ea typeface="+mj-ea"/>
           <a:cs typeface="+mj-cs"/>
         </a:defRPr>
       </a:lvl7pPr>
-      <a:lvl8pPr algn="ctr" defTabSz="914400" eaLnBrk="1" hangingPunct="1" indent="0" latinLnBrk="0" marL="3200400" rtl="0">
+      <a:lvl8pPr marL="3200400" indent="0" algn="ctr" defTabSz="914400" rtl="0" eaLnBrk="1" latinLnBrk="0" hangingPunct="1">
         <a:spcBef>
           <a:spcPct val="0"/>
         </a:spcBef>
-        <a:buFont charset="0" pitchFamily="34" typeface="Arial"/>
+        <a:buFont typeface="Arial" pitchFamily="34" charset="0"/>
         <a:buChar char="•"/>
-        <a:defRPr b="0" i="0" kern="1200" sz="3200" u="none">
+        <a:defRPr sz="3200" b="0" i="0" u="none" kern="1200">
           <a:solidFill>
             <a:prstClr val="black"/>
           </a:solidFill>
-          <a:latin charset="0" pitchFamily="34" typeface="Arial"/>
+          <a:latin typeface="Arial" pitchFamily="34" charset="0"/>
           <a:ea typeface="+mj-ea"/>
           <a:cs typeface="+mj-cs"/>
         </a:defRPr>
       </a:lvl8pPr>
-      <a:lvl9pPr algn="ctr" defTabSz="914400" eaLnBrk="1" hangingPunct="1" indent="0" latinLnBrk="0" marL="3657600" rtl="0">
+      <a:lvl9pPr marL="3657600" indent="0" algn="ctr" defTabSz="914400" rtl="0" eaLnBrk="1" latinLnBrk="0" hangingPunct="1">
         <a:spcBef>
           <a:spcPct val="0"/>
         </a:spcBef>
-        <a:buFont charset="0" pitchFamily="34" typeface="Arial"/>
+        <a:buFont typeface="Arial" pitchFamily="34" charset="0"/>
         <a:buChar char="•"/>
-        <a:defRPr b="0" i="0" kern="1200" sz="3200" u="none">
+        <a:defRPr sz="3200" b="0" i="0" u="none" kern="1200">
           <a:solidFill>
             <a:prstClr val="black"/>
           </a:solidFill>
-          <a:latin charset="0" pitchFamily="34" typeface="Arial"/>
+          <a:latin typeface="Arial" pitchFamily="34" charset="0"/>
           <a:ea typeface="+mj-ea"/>
           <a:cs typeface="+mj-cs"/>
         </a:defRPr>
@@ -577,11 +770,11 @@
 </file>
 
 <file path=ppt/slides/slide1.xml><?xml version="1.0" encoding="utf-8"?>
-<p:sld xmlns:p="http://schemas.openxmlformats.org/presentationml/2006/main" xmlns:a="http://schemas.openxmlformats.org/drawingml/2006/main" xmlns:r="http://schemas.openxmlformats.org/officeDocument/2006/relationships">
+<p:sld xmlns:a="http://schemas.openxmlformats.org/drawingml/2006/main" xmlns:r="http://schemas.openxmlformats.org/officeDocument/2006/relationships" xmlns:p="http://schemas.openxmlformats.org/presentationml/2006/main">
   <p:cSld>
     <p:spTree>
       <p:nvGrpSpPr>
-        <p:cNvPr id="11" name="SlideBase 11"/>
+        <p:cNvPr id="1" name="SlideBase 11"/>
         <p:cNvGrpSpPr/>
         <p:nvPr/>
       </p:nvGrpSpPr>
@@ -596,9 +789,11 @@
       <p:sp>
         <p:nvSpPr>
           <p:cNvPr id="12" name="Shape 12"/>
-          <p:cNvSpPr/>
+          <p:cNvSpPr>
+            <a:spLocks noGrp="1"/>
+          </p:cNvSpPr>
           <p:nvPr>
-            <p:ph idx="0" type="title"/>
+            <p:ph type="title"/>
           </p:nvPr>
         </p:nvSpPr>
         <p:spPr>
@@ -606,18 +801,21 @@
             <a:off x="476250" y="1905000"/>
             <a:ext cx="6667500" cy="952500"/>
           </a:xfrm>
-          <a:prstGeom prst="rect"/>
+          <a:prstGeom prst="rect">
+            <a:avLst/>
+          </a:prstGeom>
         </p:spPr>
         <p:txBody>
           <a:bodyPr/>
+          <a:lstStyle/>
           <a:p>
             <a:pPr algn="ctr"/>
             <a:r>
-              <a:rPr b="0" dirty="0" i="0" lang="en-US" smtClean="0" sz="4800" u="none">
+              <a:rPr lang="en-US" sz="4800" b="0" i="0" u="none" dirty="0" smtClean="0">
                 <a:solidFill>
                   <a:srgbClr val="000000"/>
                 </a:solidFill>
-                <a:latin charset="0" pitchFamily="34" typeface="Arial"/>
+                <a:latin typeface="Arial" pitchFamily="34" charset="0"/>
               </a:rPr>
               <a:t>BDD In Javascript</a:t>
             </a:r>
@@ -627,9 +825,11 @@
       <p:sp>
         <p:nvSpPr>
           <p:cNvPr id="13" name="Shape 13"/>
-          <p:cNvSpPr/>
+          <p:cNvSpPr>
+            <a:spLocks noGrp="1"/>
+          </p:cNvSpPr>
           <p:nvPr>
-            <p:ph idx="1" type="subTitle"/>
+            <p:ph type="subTitle" idx="1"/>
           </p:nvPr>
         </p:nvSpPr>
         <p:spPr>
@@ -637,18 +837,21 @@
             <a:off x="857250" y="3095625"/>
             <a:ext cx="5905500" cy="1428750"/>
           </a:xfrm>
-          <a:prstGeom prst="rect"/>
+          <a:prstGeom prst="rect">
+            <a:avLst/>
+          </a:prstGeom>
         </p:spPr>
         <p:txBody>
           <a:bodyPr/>
+          <a:lstStyle/>
           <a:p>
             <a:pPr algn="ctr"/>
             <a:r>
-              <a:rPr b="0" dirty="0" i="0" lang="en-US" smtClean="0" sz="3200" u="none">
+              <a:rPr lang="en-US" sz="3200" b="0" i="0" u="none" dirty="0" smtClean="0">
                 <a:solidFill>
                   <a:srgbClr val="000000"/>
                 </a:solidFill>
-                <a:latin charset="0" pitchFamily="34" typeface="Arial"/>
+                <a:latin typeface="Arial" pitchFamily="34" charset="0"/>
               </a:rPr>
               <a:t>Using Jasmine</a:t>
             </a:r>
@@ -656,11 +859,11 @@
           <a:p>
             <a:pPr algn="ctr"/>
             <a:r>
-              <a:rPr b="0" dirty="0" i="0" lang="en-US" smtClean="0" sz="3200" u="none">
+              <a:rPr lang="en-US" sz="3200" b="0" i="0" u="none" dirty="0" smtClean="0">
                 <a:solidFill>
                   <a:srgbClr val="000000"/>
                 </a:solidFill>
-                <a:latin charset="0" pitchFamily="34" typeface="Arial"/>
+                <a:latin typeface="Arial" pitchFamily="34" charset="0"/>
               </a:rPr>
               <a:t>A Javascript BDD Framework</a:t>
             </a:r>
@@ -676,11 +879,11 @@
 </file>
 
 <file path=ppt/slides/slide2.xml><?xml version="1.0" encoding="utf-8"?>
-<p:sld xmlns:p="http://schemas.openxmlformats.org/presentationml/2006/main" xmlns:a="http://schemas.openxmlformats.org/drawingml/2006/main" xmlns:r="http://schemas.openxmlformats.org/officeDocument/2006/relationships">
+<p:sld xmlns:a="http://schemas.openxmlformats.org/drawingml/2006/main" xmlns:r="http://schemas.openxmlformats.org/officeDocument/2006/relationships" xmlns:p="http://schemas.openxmlformats.org/presentationml/2006/main">
   <p:cSld>
     <p:spTree>
       <p:nvGrpSpPr>
-        <p:cNvPr id="14" name="SlideBase 14"/>
+        <p:cNvPr id="1" name="SlideBase 14"/>
         <p:cNvGrpSpPr/>
         <p:nvPr/>
       </p:nvGrpSpPr>
@@ -695,9 +898,11 @@
       <p:sp>
         <p:nvSpPr>
           <p:cNvPr id="15" name="Shape 15"/>
-          <p:cNvSpPr/>
+          <p:cNvSpPr>
+            <a:spLocks noGrp="1"/>
+          </p:cNvSpPr>
           <p:nvPr>
-            <p:ph idx="0" type="title"/>
+            <p:ph type="title"/>
           </p:nvPr>
         </p:nvSpPr>
         <p:spPr>
@@ -705,18 +910,21 @@
             <a:off x="238125" y="190500"/>
             <a:ext cx="7143750" cy="762000"/>
           </a:xfrm>
-          <a:prstGeom prst="rect"/>
+          <a:prstGeom prst="rect">
+            <a:avLst/>
+          </a:prstGeom>
         </p:spPr>
         <p:txBody>
           <a:bodyPr/>
+          <a:lstStyle/>
           <a:p>
             <a:pPr algn="ctr"/>
             <a:r>
-              <a:rPr b="0" dirty="0" i="0" lang="en-US" smtClean="0" sz="4800" u="none">
+              <a:rPr lang="en-US" sz="4800" b="0" i="0" u="none" dirty="0" smtClean="0">
                 <a:solidFill>
                   <a:srgbClr val="000000"/>
                 </a:solidFill>
-                <a:latin charset="0" pitchFamily="34" typeface="Arial"/>
+                <a:latin typeface="Arial" pitchFamily="34" charset="0"/>
               </a:rPr>
               <a:t>What is BDD</a:t>
             </a:r>
@@ -725,14 +933,14 @@
       </p:sp>
       <p:pic>
         <p:nvPicPr>
-          <p:cNvPr descr="photo.php?id=86812%2F97f6e3c87dde2c1df12610d12429136a" id="16" name="/ppt/media/"/>
+          <p:cNvPr id="16" name="/ppt/media/" descr="photo.php?id=86812%2F97f6e3c87dde2c1df12610d12429136a"/>
           <p:cNvPicPr>
             <a:picLocks noChangeAspect="1"/>
           </p:cNvPicPr>
           <p:nvPr/>
         </p:nvPicPr>
         <p:blipFill>
-          <a:blip r:embed="rId1"/>
+          <a:blip r:embed="rId2"/>
           <a:stretch>
             <a:fillRect/>
           </a:stretch>
@@ -742,7 +950,9 @@
             <a:off x="623888" y="2900363"/>
             <a:ext cx="6372225" cy="2886075"/>
           </a:xfrm>
-          <a:prstGeom prst="rect"/>
+          <a:prstGeom prst="rect">
+            <a:avLst/>
+          </a:prstGeom>
         </p:spPr>
       </p:pic>
       <p:sp>
@@ -756,18 +966,21 @@
             <a:off x="147638" y="928688"/>
             <a:ext cx="7324725" cy="1895475"/>
           </a:xfrm>
-          <a:prstGeom prst="rect"/>
+          <a:prstGeom prst="rect">
+            <a:avLst/>
+          </a:prstGeom>
         </p:spPr>
         <p:txBody>
           <a:bodyPr/>
+          <a:lstStyle/>
           <a:p>
             <a:pPr algn="l"/>
             <a:r>
-              <a:rPr b="0" dirty="0" i="0" lang="en-US" smtClean="0" sz="3200" u="none">
+              <a:rPr lang="en-US" sz="3200" b="0" i="0" u="none" dirty="0" smtClean="0">
                 <a:solidFill>
                   <a:srgbClr val="000000"/>
                 </a:solidFill>
-                <a:latin charset="0" pitchFamily="34" typeface="Arial"/>
+                <a:latin typeface="Arial" pitchFamily="34" charset="0"/>
               </a:rPr>
               <a:t>No, its not German engineered stainless steel blades, but it is statements that describe interactions between components in your software</a:t>
             </a:r>
@@ -783,11 +996,11 @@
 </file>
 
 <file path=ppt/slides/slide3.xml><?xml version="1.0" encoding="utf-8"?>
-<p:sld xmlns:p="http://schemas.openxmlformats.org/presentationml/2006/main" xmlns:a="http://schemas.openxmlformats.org/drawingml/2006/main" xmlns:r="http://schemas.openxmlformats.org/officeDocument/2006/relationships">
+<p:sld xmlns:a="http://schemas.openxmlformats.org/drawingml/2006/main" xmlns:r="http://schemas.openxmlformats.org/officeDocument/2006/relationships" xmlns:p="http://schemas.openxmlformats.org/presentationml/2006/main">
   <p:cSld>
     <p:spTree>
       <p:nvGrpSpPr>
-        <p:cNvPr id="18" name="SlideBase 18"/>
+        <p:cNvPr id="1" name="SlideBase 18"/>
         <p:cNvGrpSpPr/>
         <p:nvPr/>
       </p:nvGrpSpPr>
@@ -802,9 +1015,11 @@
       <p:sp>
         <p:nvSpPr>
           <p:cNvPr id="19" name="Shape 19"/>
-          <p:cNvSpPr/>
+          <p:cNvSpPr>
+            <a:spLocks noGrp="1"/>
+          </p:cNvSpPr>
           <p:nvPr>
-            <p:ph idx="0" type="title"/>
+            <p:ph type="title"/>
           </p:nvPr>
         </p:nvSpPr>
         <p:spPr>
@@ -812,18 +1027,21 @@
             <a:off x="238125" y="190500"/>
             <a:ext cx="7143750" cy="762000"/>
           </a:xfrm>
-          <a:prstGeom prst="rect"/>
+          <a:prstGeom prst="rect">
+            <a:avLst/>
+          </a:prstGeom>
         </p:spPr>
         <p:txBody>
           <a:bodyPr/>
+          <a:lstStyle/>
           <a:p>
             <a:pPr algn="ctr"/>
             <a:r>
-              <a:rPr b="0" dirty="0" i="0" lang="en-US" smtClean="0" sz="4800" u="none">
+              <a:rPr lang="en-US" sz="4800" b="0" i="0" u="none" dirty="0" smtClean="0">
                 <a:solidFill>
                   <a:srgbClr val="000000"/>
                 </a:solidFill>
-                <a:latin charset="0" pitchFamily="34" typeface="Arial"/>
+                <a:latin typeface="Arial" pitchFamily="34" charset="0"/>
               </a:rPr>
               <a:t>An Example</a:t>
             </a:r>
@@ -841,18 +1059,21 @@
             <a:off x="2328863" y="933450"/>
             <a:ext cx="2962275" cy="990600"/>
           </a:xfrm>
-          <a:prstGeom prst="rect"/>
+          <a:prstGeom prst="rect">
+            <a:avLst/>
+          </a:prstGeom>
         </p:spPr>
         <p:txBody>
           <a:bodyPr/>
+          <a:lstStyle/>
           <a:p>
             <a:pPr algn="ctr"/>
             <a:r>
-              <a:rPr b="0" dirty="0" i="0" lang="en-US" smtClean="0" sz="3200" u="none">
+              <a:rPr lang="en-US" sz="3200" b="0" i="0" u="none" dirty="0" smtClean="0">
                 <a:solidFill>
                   <a:srgbClr val="000000"/>
                 </a:solidFill>
-                <a:latin charset="0" pitchFamily="34" typeface="Arial"/>
+                <a:latin typeface="Arial" pitchFamily="34" charset="0"/>
               </a:rPr>
               <a:t>To Ze Code</a:t>
             </a:r>
@@ -861,14 +1082,14 @@
       </p:sp>
       <p:pic>
         <p:nvPicPr>
-          <p:cNvPr descr="photo.php?id=86812%2Fdf02925d52d4a92a40ea3c190def86c7" id="21" name="/ppt/media/"/>
+          <p:cNvPr id="21" name="/ppt/media/" descr="photo.php?id=86812%2Fdf02925d52d4a92a40ea3c190def86c7"/>
           <p:cNvPicPr>
             <a:picLocks noChangeAspect="1"/>
           </p:cNvPicPr>
           <p:nvPr/>
         </p:nvPicPr>
         <p:blipFill>
-          <a:blip r:embed="rId1"/>
+          <a:blip r:embed="rId2"/>
           <a:stretch>
             <a:fillRect/>
           </a:stretch>
@@ -878,7 +1099,9 @@
             <a:off x="1209675" y="1771650"/>
             <a:ext cx="5200650" cy="3352800"/>
           </a:xfrm>
-          <a:prstGeom prst="rect"/>
+          <a:prstGeom prst="rect">
+            <a:avLst/>
+          </a:prstGeom>
         </p:spPr>
       </p:pic>
     </p:spTree>
@@ -890,11 +1113,11 @@
 </file>
 
 <file path=ppt/slides/slide4.xml><?xml version="1.0" encoding="utf-8"?>
-<p:sld xmlns:p="http://schemas.openxmlformats.org/presentationml/2006/main" xmlns:a="http://schemas.openxmlformats.org/drawingml/2006/main" xmlns:r="http://schemas.openxmlformats.org/officeDocument/2006/relationships">
+<p:sld xmlns:a="http://schemas.openxmlformats.org/drawingml/2006/main" xmlns:r="http://schemas.openxmlformats.org/officeDocument/2006/relationships" xmlns:p="http://schemas.openxmlformats.org/presentationml/2006/main">
   <p:cSld>
     <p:spTree>
       <p:nvGrpSpPr>
-        <p:cNvPr id="22" name="SlideBase 22"/>
+        <p:cNvPr id="1" name="SlideBase 22"/>
         <p:cNvGrpSpPr/>
         <p:nvPr/>
       </p:nvGrpSpPr>
@@ -909,9 +1132,11 @@
       <p:sp>
         <p:nvSpPr>
           <p:cNvPr id="23" name="Shape 23"/>
-          <p:cNvSpPr/>
+          <p:cNvSpPr>
+            <a:spLocks noGrp="1"/>
+          </p:cNvSpPr>
           <p:nvPr>
-            <p:ph idx="0" type="title"/>
+            <p:ph type="title"/>
           </p:nvPr>
         </p:nvSpPr>
         <p:spPr>
@@ -919,18 +1144,21 @@
             <a:off x="238125" y="185738"/>
             <a:ext cx="7143750" cy="2085975"/>
           </a:xfrm>
-          <a:prstGeom prst="rect"/>
+          <a:prstGeom prst="rect">
+            <a:avLst/>
+          </a:prstGeom>
         </p:spPr>
         <p:txBody>
           <a:bodyPr/>
+          <a:lstStyle/>
           <a:p>
             <a:pPr algn="ctr"/>
             <a:r>
-              <a:rPr b="0" dirty="0" i="0" lang="en-US" smtClean="0" sz="4800" u="none">
+              <a:rPr lang="en-US" sz="4800" b="0" i="0" u="none" dirty="0" smtClean="0">
                 <a:solidFill>
                   <a:srgbClr val="000000"/>
                 </a:solidFill>
-                <a:latin charset="0" pitchFamily="34" typeface="Arial"/>
+                <a:latin typeface="Arial" pitchFamily="34" charset="0"/>
               </a:rPr>
               <a:t>Could This example have been written faster and better using BDD</a:t>
             </a:r>
@@ -939,24 +1167,26 @@
       </p:sp>
       <p:pic>
         <p:nvPicPr>
-          <p:cNvPr descr="photo.php?id=86812%2F980455f34aa08a240b03b88671f6f38f" id="24" name="/ppt/media/"/>
+          <p:cNvPr id="24" name="/ppt/media/" descr="photo.php?id=86812%2F980455f34aa08a240b03b88671f6f38f"/>
           <p:cNvPicPr>
             <a:picLocks noChangeAspect="1"/>
           </p:cNvPicPr>
           <p:nvPr/>
         </p:nvPicPr>
         <p:blipFill>
-          <a:blip r:embed="rId1"/>
+          <a:blip r:embed="rId2"/>
           <a:stretch>
             <a:fillRect/>
           </a:stretch>
         </p:blipFill>
         <p:spPr>
           <a:xfrm>
-            <a:off x="2400300" y="2357438"/>
+            <a:off x="2400300" y="2543175"/>
             <a:ext cx="2819400" cy="3286125"/>
           </a:xfrm>
-          <a:prstGeom prst="rect"/>
+          <a:prstGeom prst="rect">
+            <a:avLst/>
+          </a:prstGeom>
         </p:spPr>
       </p:pic>
     </p:spTree>
@@ -968,11 +1198,11 @@
 </file>
 
 <file path=ppt/slides/slide5.xml><?xml version="1.0" encoding="utf-8"?>
-<p:sld xmlns:p="http://schemas.openxmlformats.org/presentationml/2006/main" xmlns:a="http://schemas.openxmlformats.org/drawingml/2006/main" xmlns:r="http://schemas.openxmlformats.org/officeDocument/2006/relationships">
+<p:sld xmlns:a="http://schemas.openxmlformats.org/drawingml/2006/main" xmlns:r="http://schemas.openxmlformats.org/officeDocument/2006/relationships" xmlns:p="http://schemas.openxmlformats.org/presentationml/2006/main">
   <p:cSld>
     <p:spTree>
       <p:nvGrpSpPr>
-        <p:cNvPr id="25" name="SlideBase 25"/>
+        <p:cNvPr id="1" name="SlideBase 25"/>
         <p:cNvGrpSpPr/>
         <p:nvPr/>
       </p:nvGrpSpPr>
@@ -987,9 +1217,11 @@
       <p:sp>
         <p:nvSpPr>
           <p:cNvPr id="26" name="Shape 26"/>
-          <p:cNvSpPr/>
+          <p:cNvSpPr>
+            <a:spLocks noGrp="1"/>
+          </p:cNvSpPr>
           <p:nvPr>
-            <p:ph idx="0" type="title"/>
+            <p:ph type="title"/>
           </p:nvPr>
         </p:nvSpPr>
         <p:spPr>
@@ -997,18 +1229,21 @@
             <a:off x="238125" y="190500"/>
             <a:ext cx="7143750" cy="762000"/>
           </a:xfrm>
-          <a:prstGeom prst="rect"/>
+          <a:prstGeom prst="rect">
+            <a:avLst/>
+          </a:prstGeom>
         </p:spPr>
         <p:txBody>
           <a:bodyPr/>
+          <a:lstStyle/>
           <a:p>
             <a:pPr algn="ctr"/>
             <a:r>
-              <a:rPr b="0" dirty="0" i="0" lang="en-US" smtClean="0" sz="4800" u="none">
+              <a:rPr lang="en-US" sz="4800" b="0" i="0" u="none" dirty="0" smtClean="0">
                 <a:solidFill>
                   <a:srgbClr val="000000"/>
                 </a:solidFill>
-                <a:latin charset="0" pitchFamily="34" typeface="Arial"/>
+                <a:latin typeface="Arial" pitchFamily="34" charset="0"/>
               </a:rPr>
               <a:t>BDD to the rescue</a:t>
             </a:r>
@@ -1017,14 +1252,14 @@
       </p:sp>
       <p:pic>
         <p:nvPicPr>
-          <p:cNvPr descr="photo.php?id=86812%2F7d50be327fa56fdf142ca00b38ec7537" id="27" name="/ppt/media/"/>
+          <p:cNvPr id="27" name="/ppt/media/" descr="photo.php?id=86812%2F7d50be327fa56fdf142ca00b38ec7537"/>
           <p:cNvPicPr>
             <a:picLocks noChangeAspect="1"/>
           </p:cNvPicPr>
           <p:nvPr/>
         </p:nvPicPr>
         <p:blipFill>
-          <a:blip r:embed="rId1"/>
+          <a:blip r:embed="rId2"/>
           <a:stretch>
             <a:fillRect/>
           </a:stretch>
@@ -1034,7 +1269,9 @@
             <a:off x="1428750" y="1395413"/>
             <a:ext cx="4762500" cy="3800475"/>
           </a:xfrm>
-          <a:prstGeom prst="rect"/>
+          <a:prstGeom prst="rect">
+            <a:avLst/>
+          </a:prstGeom>
         </p:spPr>
       </p:pic>
     </p:spTree>
@@ -1046,11 +1283,11 @@
 </file>
 
 <file path=ppt/slides/slide6.xml><?xml version="1.0" encoding="utf-8"?>
-<p:sld xmlns:p="http://schemas.openxmlformats.org/presentationml/2006/main" xmlns:a="http://schemas.openxmlformats.org/drawingml/2006/main" xmlns:r="http://schemas.openxmlformats.org/officeDocument/2006/relationships">
+<p:sld xmlns:a="http://schemas.openxmlformats.org/drawingml/2006/main" xmlns:r="http://schemas.openxmlformats.org/officeDocument/2006/relationships" xmlns:p="http://schemas.openxmlformats.org/presentationml/2006/main">
   <p:cSld>
     <p:spTree>
       <p:nvGrpSpPr>
-        <p:cNvPr id="28" name="SlideBase 28"/>
+        <p:cNvPr id="1" name="SlideBase 28"/>
         <p:cNvGrpSpPr/>
         <p:nvPr/>
       </p:nvGrpSpPr>
@@ -1073,7 +1310,9 @@
             <a:off x="1019175" y="2728913"/>
             <a:ext cx="1657350" cy="962025"/>
           </a:xfrm>
-          <a:prstGeom prst="rect"/>
+          <a:prstGeom prst="rect">
+            <a:avLst/>
+          </a:prstGeom>
           <a:solidFill>
             <a:srgbClr val="DBDBDB">
               <a:alpha val="75843"/>
@@ -1092,7 +1331,9 @@
             <a:off x="2976563" y="2724150"/>
             <a:ext cx="1666875" cy="971550"/>
           </a:xfrm>
-          <a:prstGeom prst="rect"/>
+          <a:prstGeom prst="rect">
+            <a:avLst/>
+          </a:prstGeom>
           <a:solidFill>
             <a:srgbClr val="DBDBDB">
               <a:alpha val="75843"/>
@@ -1103,9 +1344,11 @@
       <p:sp>
         <p:nvSpPr>
           <p:cNvPr id="31" name="Shape 31"/>
-          <p:cNvSpPr/>
+          <p:cNvSpPr>
+            <a:spLocks noGrp="1"/>
+          </p:cNvSpPr>
           <p:nvPr>
-            <p:ph idx="0" type="title"/>
+            <p:ph type="title"/>
           </p:nvPr>
         </p:nvSpPr>
         <p:spPr>
@@ -1113,18 +1356,21 @@
             <a:off x="238125" y="190500"/>
             <a:ext cx="7143750" cy="762000"/>
           </a:xfrm>
-          <a:prstGeom prst="rect"/>
+          <a:prstGeom prst="rect">
+            <a:avLst/>
+          </a:prstGeom>
         </p:spPr>
         <p:txBody>
           <a:bodyPr/>
+          <a:lstStyle/>
           <a:p>
             <a:pPr algn="ctr"/>
             <a:r>
-              <a:rPr b="0" dirty="0" i="0" lang="en-US" smtClean="0" sz="4800" u="none">
+              <a:rPr lang="en-US" sz="4800" b="0" i="0" u="none" dirty="0" smtClean="0">
                 <a:solidFill>
                   <a:srgbClr val="000000"/>
                 </a:solidFill>
-                <a:latin charset="0" pitchFamily="34" typeface="Arial"/>
+                <a:latin typeface="Arial" pitchFamily="34" charset="0"/>
               </a:rPr>
               <a:t>Jasmine Building Blocks</a:t>
             </a:r>
@@ -1142,18 +1388,21 @@
             <a:off x="771525" y="3043238"/>
             <a:ext cx="2000250" cy="295275"/>
           </a:xfrm>
-          <a:prstGeom prst="rect"/>
+          <a:prstGeom prst="rect">
+            <a:avLst/>
+          </a:prstGeom>
         </p:spPr>
         <p:txBody>
           <a:bodyPr/>
+          <a:lstStyle/>
           <a:p>
             <a:pPr algn="ctr"/>
             <a:r>
-              <a:rPr b="0" dirty="0" i="0" lang="en-US" smtClean="0" sz="2000" u="none">
+              <a:rPr lang="en-US" sz="2000" b="0" i="0" u="none" dirty="0" smtClean="0">
                 <a:solidFill>
                   <a:srgbClr val="000000"/>
                 </a:solidFill>
-                <a:latin charset="0" pitchFamily="34" typeface="Arial"/>
+                <a:latin typeface="Arial" pitchFamily="34" charset="0"/>
               </a:rPr>
               <a:t>describe</a:t>
             </a:r>
@@ -1171,18 +1420,21 @@
             <a:off x="3095625" y="3028950"/>
             <a:ext cx="1428750" cy="495300"/>
           </a:xfrm>
-          <a:prstGeom prst="rect"/>
+          <a:prstGeom prst="rect">
+            <a:avLst/>
+          </a:prstGeom>
         </p:spPr>
         <p:txBody>
           <a:bodyPr/>
+          <a:lstStyle/>
           <a:p>
             <a:pPr algn="ctr"/>
             <a:r>
-              <a:rPr b="0" dirty="0" i="0" lang="en-US" smtClean="0" sz="2000" u="none">
+              <a:rPr lang="en-US" sz="2000" b="0" i="0" u="none" dirty="0" smtClean="0">
                 <a:solidFill>
                   <a:srgbClr val="000000"/>
                 </a:solidFill>
-                <a:latin charset="0" pitchFamily="34" typeface="Arial"/>
+                <a:latin typeface="Arial" pitchFamily="34" charset="0"/>
               </a:rPr>
               <a:t>it</a:t>
             </a:r>
@@ -1200,7 +1452,9 @@
             <a:off x="4095750" y="1728788"/>
             <a:ext cx="1676400" cy="1000125"/>
           </a:xfrm>
-          <a:prstGeom prst="rect"/>
+          <a:prstGeom prst="rect">
+            <a:avLst/>
+          </a:prstGeom>
           <a:solidFill>
             <a:srgbClr val="DBDBDB"/>
           </a:solidFill>
@@ -1217,7 +1471,9 @@
             <a:off x="5153025" y="2695575"/>
             <a:ext cx="1695450" cy="1009650"/>
           </a:xfrm>
-          <a:prstGeom prst="rect"/>
+          <a:prstGeom prst="rect">
+            <a:avLst/>
+          </a:prstGeom>
           <a:solidFill>
             <a:srgbClr val="DBDBDB">
               <a:alpha val="75843"/>
@@ -1236,18 +1492,21 @@
             <a:off x="4238625" y="2085975"/>
             <a:ext cx="1428750" cy="304800"/>
           </a:xfrm>
-          <a:prstGeom prst="rect"/>
+          <a:prstGeom prst="rect">
+            <a:avLst/>
+          </a:prstGeom>
         </p:spPr>
         <p:txBody>
           <a:bodyPr/>
+          <a:lstStyle/>
           <a:p>
             <a:pPr algn="ctr"/>
             <a:r>
-              <a:rPr b="0" dirty="0" i="0" lang="en-US" smtClean="0" sz="2000" u="none">
+              <a:rPr lang="en-US" sz="2000" b="0" i="0" u="none" dirty="0" smtClean="0">
                 <a:solidFill>
                   <a:srgbClr val="000000"/>
                 </a:solidFill>
-                <a:latin charset="0" pitchFamily="34" typeface="Arial"/>
+                <a:latin typeface="Arial" pitchFamily="34" charset="0"/>
               </a:rPr>
               <a:t>spies</a:t>
             </a:r>
@@ -1265,7 +1524,9 @@
             <a:off x="1990725" y="1709738"/>
             <a:ext cx="1695450" cy="1019175"/>
           </a:xfrm>
-          <a:prstGeom prst="rect"/>
+          <a:prstGeom prst="rect">
+            <a:avLst/>
+          </a:prstGeom>
           <a:solidFill>
             <a:srgbClr val="DBDBDB">
               <a:alpha val="75843"/>
@@ -1284,18 +1545,21 @@
             <a:off x="5262563" y="3081338"/>
             <a:ext cx="1495425" cy="352425"/>
           </a:xfrm>
-          <a:prstGeom prst="rect"/>
+          <a:prstGeom prst="rect">
+            <a:avLst/>
+          </a:prstGeom>
         </p:spPr>
         <p:txBody>
           <a:bodyPr/>
+          <a:lstStyle/>
           <a:p>
             <a:pPr algn="ctr"/>
             <a:r>
-              <a:rPr b="0" dirty="0" i="0" lang="en-US" smtClean="0" sz="2000" u="none">
+              <a:rPr lang="en-US" sz="2000" b="0" i="0" u="none" dirty="0" smtClean="0">
                 <a:solidFill>
                   <a:srgbClr val="000000"/>
                 </a:solidFill>
-                <a:latin charset="0" pitchFamily="34" typeface="Arial"/>
+                <a:latin typeface="Arial" pitchFamily="34" charset="0"/>
               </a:rPr>
               <a:t>before / after</a:t>
             </a:r>
@@ -1313,7 +1577,9 @@
             <a:off x="581025" y="3709988"/>
             <a:ext cx="6667500" cy="1323975"/>
           </a:xfrm>
-          <a:prstGeom prst="rect"/>
+          <a:prstGeom prst="rect">
+            <a:avLst/>
+          </a:prstGeom>
           <a:solidFill>
             <a:srgbClr val="DBDBDB">
               <a:alpha val="75843"/>
@@ -1332,18 +1598,21 @@
             <a:off x="3095625" y="4100513"/>
             <a:ext cx="1428750" cy="428625"/>
           </a:xfrm>
-          <a:prstGeom prst="rect"/>
+          <a:prstGeom prst="rect">
+            <a:avLst/>
+          </a:prstGeom>
         </p:spPr>
         <p:txBody>
           <a:bodyPr/>
+          <a:lstStyle/>
           <a:p>
             <a:pPr algn="ctr"/>
             <a:r>
-              <a:rPr b="0" dirty="0" i="0" lang="en-US" smtClean="0" sz="2000" u="none">
+              <a:rPr lang="en-US" sz="2000" b="0" i="0" u="none" dirty="0" smtClean="0">
                 <a:solidFill>
                   <a:srgbClr val="000000"/>
                 </a:solidFill>
-                <a:latin charset="0" pitchFamily="34" typeface="Arial"/>
+                <a:latin typeface="Arial" pitchFamily="34" charset="0"/>
               </a:rPr>
               <a:t>spec.html</a:t>
             </a:r>
@@ -1361,18 +1630,21 @@
             <a:off x="2157413" y="2057400"/>
             <a:ext cx="1343025" cy="361950"/>
           </a:xfrm>
-          <a:prstGeom prst="rect"/>
+          <a:prstGeom prst="rect">
+            <a:avLst/>
+          </a:prstGeom>
         </p:spPr>
         <p:txBody>
           <a:bodyPr/>
+          <a:lstStyle/>
           <a:p>
             <a:pPr algn="ctr"/>
             <a:r>
-              <a:rPr b="0" dirty="0" i="0" lang="en-US" smtClean="0" sz="2000" u="none">
+              <a:rPr lang="en-US" sz="2000" b="0" i="0" u="none" dirty="0" smtClean="0">
                 <a:solidFill>
                   <a:srgbClr val="000000"/>
                 </a:solidFill>
-                <a:latin charset="0" pitchFamily="34" typeface="Arial"/>
+                <a:latin typeface="Arial" pitchFamily="34" charset="0"/>
               </a:rPr>
               <a:t>matchers</a:t>
             </a:r>
@@ -1388,11 +1660,11 @@
 </file>
 
 <file path=ppt/slides/slide7.xml><?xml version="1.0" encoding="utf-8"?>
-<p:sld xmlns:p="http://schemas.openxmlformats.org/presentationml/2006/main" xmlns:a="http://schemas.openxmlformats.org/drawingml/2006/main" xmlns:r="http://schemas.openxmlformats.org/officeDocument/2006/relationships">
+<p:sld xmlns:a="http://schemas.openxmlformats.org/drawingml/2006/main" xmlns:r="http://schemas.openxmlformats.org/officeDocument/2006/relationships" xmlns:p="http://schemas.openxmlformats.org/presentationml/2006/main">
   <p:cSld>
     <p:spTree>
       <p:nvGrpSpPr>
-        <p:cNvPr id="42" name="SlideBase 42"/>
+        <p:cNvPr id="1" name="SlideBase 42"/>
         <p:cNvGrpSpPr/>
         <p:nvPr/>
       </p:nvGrpSpPr>
@@ -1407,9 +1679,11 @@
       <p:sp>
         <p:nvSpPr>
           <p:cNvPr id="43" name="Shape 43"/>
-          <p:cNvSpPr/>
+          <p:cNvSpPr>
+            <a:spLocks noGrp="1"/>
+          </p:cNvSpPr>
           <p:nvPr>
-            <p:ph idx="0" type="title"/>
+            <p:ph type="title"/>
           </p:nvPr>
         </p:nvSpPr>
         <p:spPr>
@@ -1417,18 +1691,21 @@
             <a:off x="238125" y="190500"/>
             <a:ext cx="7143750" cy="762000"/>
           </a:xfrm>
-          <a:prstGeom prst="rect"/>
+          <a:prstGeom prst="rect">
+            <a:avLst/>
+          </a:prstGeom>
         </p:spPr>
         <p:txBody>
           <a:bodyPr/>
+          <a:lstStyle/>
           <a:p>
             <a:pPr algn="ctr"/>
             <a:r>
-              <a:rPr b="0" dirty="0" i="0" lang="en-US" smtClean="0" sz="4800" u="none">
+              <a:rPr lang="en-US" sz="4800" b="0" i="0" u="none" dirty="0" smtClean="0">
                 <a:solidFill>
                   <a:srgbClr val="000000"/>
                 </a:solidFill>
-                <a:latin charset="0" pitchFamily="34" typeface="Arial"/>
+                <a:latin typeface="Arial" pitchFamily="34" charset="0"/>
               </a:rPr>
               <a:t>An Example using BDD</a:t>
             </a:r>
@@ -1442,22 +1719,25 @@
           <p:nvPr/>
         </p:nvSpPr>
         <p:spPr>
-          <a:xfrm flipV="true">
+          <a:xfrm rot="10800000" flipV="1">
             <a:off x="2500313" y="933450"/>
             <a:ext cx="2619375" cy="495300"/>
           </a:xfrm>
-          <a:prstGeom prst="rect"/>
+          <a:prstGeom prst="rect">
+            <a:avLst/>
+          </a:prstGeom>
         </p:spPr>
         <p:txBody>
           <a:bodyPr/>
+          <a:lstStyle/>
           <a:p>
             <a:pPr algn="ctr"/>
             <a:r>
-              <a:rPr b="0" dirty="0" i="0" lang="en-US" smtClean="0" sz="3200" u="none">
+              <a:rPr lang="en-US" sz="3200" b="0" i="0" u="none" dirty="0" smtClean="0">
                 <a:solidFill>
                   <a:srgbClr val="000000"/>
                 </a:solidFill>
-                <a:latin charset="0" pitchFamily="34" typeface="Arial"/>
+                <a:latin typeface="Arial" pitchFamily="34" charset="0"/>
               </a:rPr>
               <a:t>To Ze Code</a:t>
             </a:r>
@@ -1466,14 +1746,14 @@
       </p:sp>
       <p:pic>
         <p:nvPicPr>
-          <p:cNvPr descr="photo.php?id=86812%2F49016c20cac2153f97bd34ee7a3bcb63" id="45" name="/ppt/media/"/>
+          <p:cNvPr id="45" name="/ppt/media/" descr="photo.php?id=86812%2F49016c20cac2153f97bd34ee7a3bcb63"/>
           <p:cNvPicPr>
             <a:picLocks noChangeAspect="1"/>
           </p:cNvPicPr>
           <p:nvPr/>
         </p:nvPicPr>
         <p:blipFill>
-          <a:blip r:embed="rId1"/>
+          <a:blip r:embed="rId2"/>
           <a:stretch>
             <a:fillRect/>
           </a:stretch>
@@ -1483,7 +1763,9 @@
             <a:off x="1576388" y="1785938"/>
             <a:ext cx="4467225" cy="3343275"/>
           </a:xfrm>
-          <a:prstGeom prst="rect"/>
+          <a:prstGeom prst="rect">
+            <a:avLst/>
+          </a:prstGeom>
         </p:spPr>
       </p:pic>
     </p:spTree>
@@ -1495,11 +1777,11 @@
 </file>
 
 <file path=ppt/slides/slide8.xml><?xml version="1.0" encoding="utf-8"?>
-<p:sld xmlns:p="http://schemas.openxmlformats.org/presentationml/2006/main" xmlns:a="http://schemas.openxmlformats.org/drawingml/2006/main" xmlns:r="http://schemas.openxmlformats.org/officeDocument/2006/relationships">
+<p:sld xmlns:a="http://schemas.openxmlformats.org/drawingml/2006/main" xmlns:r="http://schemas.openxmlformats.org/officeDocument/2006/relationships" xmlns:p="http://schemas.openxmlformats.org/presentationml/2006/main">
   <p:cSld>
     <p:spTree>
       <p:nvGrpSpPr>
-        <p:cNvPr id="46" name="SlideBase 46"/>
+        <p:cNvPr id="1" name="SlideBase 46"/>
         <p:cNvGrpSpPr/>
         <p:nvPr/>
       </p:nvGrpSpPr>
@@ -1514,9 +1796,11 @@
       <p:sp>
         <p:nvSpPr>
           <p:cNvPr id="47" name="Shape 47"/>
-          <p:cNvSpPr/>
+          <p:cNvSpPr>
+            <a:spLocks noGrp="1"/>
+          </p:cNvSpPr>
           <p:nvPr>
-            <p:ph idx="0" type="title"/>
+            <p:ph type="title"/>
           </p:nvPr>
         </p:nvSpPr>
         <p:spPr>
@@ -1524,18 +1808,21 @@
             <a:off x="238125" y="190500"/>
             <a:ext cx="7143750" cy="762000"/>
           </a:xfrm>
-          <a:prstGeom prst="rect"/>
+          <a:prstGeom prst="rect">
+            <a:avLst/>
+          </a:prstGeom>
         </p:spPr>
         <p:txBody>
           <a:bodyPr/>
+          <a:lstStyle/>
           <a:p>
             <a:pPr algn="ctr"/>
             <a:r>
-              <a:rPr b="0" dirty="0" i="0" lang="en-US" smtClean="0" sz="4800" u="none">
+              <a:rPr lang="en-US" sz="4800" b="0" i="0" u="none" dirty="0" smtClean="0">
                 <a:solidFill>
                   <a:srgbClr val="000000"/>
                 </a:solidFill>
-                <a:latin charset="0" pitchFamily="34" typeface="Arial"/>
+                <a:latin typeface="Arial" pitchFamily="34" charset="0"/>
               </a:rPr>
               <a:t>Exercise</a:t>
             </a:r>
@@ -1544,14 +1831,14 @@
       </p:sp>
       <p:pic>
         <p:nvPicPr>
-          <p:cNvPr descr="photo.php?id=86812%2Fd0e520263671268ad56700c4301c5ee0" id="48" name="/ppt/media/"/>
+          <p:cNvPr id="48" name="/ppt/media/" descr="photo.php?id=86812%2Fd0e520263671268ad56700c4301c5ee0"/>
           <p:cNvPicPr>
             <a:picLocks noChangeAspect="1"/>
           </p:cNvPicPr>
           <p:nvPr/>
         </p:nvPicPr>
         <p:blipFill>
-          <a:blip r:embed="rId1"/>
+          <a:blip r:embed="rId2"/>
           <a:stretch>
             <a:fillRect/>
           </a:stretch>
@@ -1561,7 +1848,9 @@
             <a:off x="1042988" y="976313"/>
             <a:ext cx="5743575" cy="4714875"/>
           </a:xfrm>
-          <a:prstGeom prst="rect"/>
+          <a:prstGeom prst="rect">
+            <a:avLst/>
+          </a:prstGeom>
         </p:spPr>
       </p:pic>
     </p:spTree>
@@ -1573,11 +1862,11 @@
 </file>
 
 <file path=ppt/slides/slide9.xml><?xml version="1.0" encoding="utf-8"?>
-<p:sld xmlns:p="http://schemas.openxmlformats.org/presentationml/2006/main" xmlns:a="http://schemas.openxmlformats.org/drawingml/2006/main" xmlns:r="http://schemas.openxmlformats.org/officeDocument/2006/relationships">
+<p:sld xmlns:a="http://schemas.openxmlformats.org/drawingml/2006/main" xmlns:r="http://schemas.openxmlformats.org/officeDocument/2006/relationships" xmlns:p="http://schemas.openxmlformats.org/presentationml/2006/main">
   <p:cSld>
     <p:spTree>
       <p:nvGrpSpPr>
-        <p:cNvPr id="49" name="SlideBase 49"/>
+        <p:cNvPr id="1" name="SlideBase 49"/>
         <p:cNvGrpSpPr/>
         <p:nvPr/>
       </p:nvGrpSpPr>
@@ -1592,9 +1881,11 @@
       <p:sp>
         <p:nvSpPr>
           <p:cNvPr id="50" name="Shape 50"/>
-          <p:cNvSpPr/>
+          <p:cNvSpPr>
+            <a:spLocks noGrp="1"/>
+          </p:cNvSpPr>
           <p:nvPr>
-            <p:ph idx="0" type="title"/>
+            <p:ph type="title"/>
           </p:nvPr>
         </p:nvSpPr>
         <p:spPr>
@@ -1602,18 +1893,21 @@
             <a:off x="238125" y="190500"/>
             <a:ext cx="7143750" cy="762000"/>
           </a:xfrm>
-          <a:prstGeom prst="rect"/>
+          <a:prstGeom prst="rect">
+            <a:avLst/>
+          </a:prstGeom>
         </p:spPr>
         <p:txBody>
           <a:bodyPr/>
+          <a:lstStyle/>
           <a:p>
             <a:pPr algn="ctr"/>
             <a:r>
-              <a:rPr b="0" dirty="0" i="0" lang="en-US" smtClean="0" sz="4800" u="none">
+              <a:rPr lang="en-US" sz="4800" b="0" i="0" u="none" dirty="0" smtClean="0">
                 <a:solidFill>
                   <a:srgbClr val="000000"/>
                 </a:solidFill>
-                <a:latin charset="0" pitchFamily="34" typeface="Arial"/>
+                <a:latin typeface="Arial" pitchFamily="34" charset="0"/>
               </a:rPr>
               <a:t>Lets Go Bowling</a:t>
             </a:r>
@@ -1623,9 +1917,11 @@
       <p:sp>
         <p:nvSpPr>
           <p:cNvPr id="51" name="Shape 51"/>
-          <p:cNvSpPr/>
+          <p:cNvSpPr>
+            <a:spLocks noGrp="1"/>
+          </p:cNvSpPr>
           <p:nvPr>
-            <p:ph idx="2" type="body"/>
+            <p:ph type="body" idx="2"/>
           </p:nvPr>
         </p:nvSpPr>
         <p:spPr>
@@ -1633,18 +1929,21 @@
             <a:off x="238125" y="1143000"/>
             <a:ext cx="7143750" cy="4381500"/>
           </a:xfrm>
-          <a:prstGeom prst="rect"/>
+          <a:prstGeom prst="rect">
+            <a:avLst/>
+          </a:prstGeom>
         </p:spPr>
         <p:txBody>
           <a:bodyPr/>
+          <a:lstStyle/>
           <a:p>
             <a:pPr algn="l"/>
             <a:r>
-              <a:rPr b="0" dirty="0" i="0" lang="en-US" smtClean="0" sz="3200" u="none">
+              <a:rPr lang="en-US" sz="3200" b="0" i="0" u="none" dirty="0" smtClean="0">
                 <a:solidFill>
                   <a:srgbClr val="000000"/>
                 </a:solidFill>
-                <a:latin charset="0" pitchFamily="34" typeface="Arial"/>
+                <a:latin typeface="Arial" pitchFamily="34" charset="0"/>
               </a:rPr>
               <a:t>Rules:</a:t>
             </a:r>
@@ -1652,11 +1951,11 @@
           <a:p>
             <a:pPr algn="l"/>
             <a:r>
-              <a:rPr b="0" dirty="0" i="0" lang="en-US" smtClean="0" sz="2000" u="none">
+              <a:rPr lang="en-US" sz="2000" b="0" i="0" u="none" dirty="0" smtClean="0">
                 <a:solidFill>
                   <a:srgbClr val="000000"/>
                 </a:solidFill>
-                <a:latin charset="0" pitchFamily="34" typeface="Arial"/>
+                <a:latin typeface="Arial" pitchFamily="34" charset="0"/>
               </a:rPr>
               <a:t>1. Highest score is 300</a:t>
             </a:r>
@@ -1664,11 +1963,11 @@
           <a:p>
             <a:pPr algn="l"/>
             <a:r>
-              <a:rPr b="0" dirty="0" i="0" lang="en-US" smtClean="0" sz="2000" u="none">
+              <a:rPr lang="en-US" sz="2000" b="0" i="0" u="none" dirty="0" smtClean="0">
                 <a:solidFill>
                   <a:srgbClr val="000000"/>
                 </a:solidFill>
-                <a:latin charset="0" pitchFamily="34" typeface="Arial"/>
+                <a:latin typeface="Arial" pitchFamily="34" charset="0"/>
               </a:rPr>
               <a:t>2. Total of 10 frames</a:t>
             </a:r>
@@ -1676,11 +1975,11 @@
           <a:p>
             <a:pPr algn="l"/>
             <a:r>
-              <a:rPr b="0" dirty="0" i="0" lang="en-US" smtClean="0" sz="2000" u="none">
+              <a:rPr lang="en-US" sz="2000" b="0" i="0" u="none" dirty="0" smtClean="0">
                 <a:solidFill>
                   <a:srgbClr val="000000"/>
                 </a:solidFill>
-                <a:latin charset="0" pitchFamily="34" typeface="Arial"/>
+                <a:latin typeface="Arial" pitchFamily="34" charset="0"/>
               </a:rPr>
               <a:t>3.  Two Bowling attempts in each frame</a:t>
             </a:r>
@@ -1688,105 +1987,77 @@
           <a:p>
             <a:pPr algn="l"/>
             <a:r>
-              <a:rPr b="0" dirty="0" i="0" lang="en-US" smtClean="0" sz="2000" u="none">
+              <a:rPr lang="en-US" sz="2000" b="0" i="0" u="none" dirty="0" smtClean="0">
                 <a:solidFill>
                   <a:srgbClr val="000000"/>
                 </a:solidFill>
-                <a:latin charset="0" pitchFamily="34" typeface="Arial"/>
+                <a:latin typeface="Arial" pitchFamily="34" charset="0"/>
               </a:rPr>
               <a:t>4.  A Spare is scored by adding 10 to the number of pins knocked down in the first bowl in the next frame</a:t>
             </a:r>
           </a:p>
           <a:p>
             <a:pPr algn="l"/>
+            <a:endParaRPr lang="en-US" sz="2000" b="0" i="0" u="none" dirty="0" smtClean="0">
+              <a:solidFill>
+                <a:srgbClr val="000000"/>
+              </a:solidFill>
+              <a:latin typeface="Arial" pitchFamily="34" charset="0"/>
+            </a:endParaRPr>
+          </a:p>
+          <a:p>
+            <a:pPr algn="l"/>
+            <a:endParaRPr lang="en-US" sz="2000" b="0" i="0" u="none" dirty="0" smtClean="0">
+              <a:solidFill>
+                <a:srgbClr val="000000"/>
+              </a:solidFill>
+              <a:latin typeface="Arial" pitchFamily="34" charset="0"/>
+            </a:endParaRPr>
+          </a:p>
+          <a:p>
+            <a:pPr algn="l"/>
+            <a:endParaRPr lang="en-US" sz="2000" b="0" i="0" u="none" dirty="0" smtClean="0">
+              <a:solidFill>
+                <a:srgbClr val="000000"/>
+              </a:solidFill>
+              <a:latin typeface="Arial" pitchFamily="34" charset="0"/>
+            </a:endParaRPr>
+          </a:p>
+          <a:p>
+            <a:pPr algn="l"/>
             <a:r>
-              <a:rPr b="0" dirty="0" i="0" lang="en-US" smtClean="0" sz="2000" u="none">
+              <a:rPr lang="en-US" sz="2000" b="0" i="0" u="none" dirty="0" smtClean="0">
                 <a:solidFill>
                   <a:srgbClr val="000000"/>
                 </a:solidFill>
-                <a:latin charset="0" pitchFamily="34" typeface="Arial"/>
-              </a:rPr>
-              <a:t/>
-            </a:r>
-          </a:p>
-          <a:p>
-            <a:pPr algn="l"/>
-            <a:r>
-              <a:rPr b="0" dirty="0" i="0" lang="en-US" smtClean="0" sz="2000" u="none">
-                <a:solidFill>
-                  <a:srgbClr val="000000"/>
-                </a:solidFill>
-                <a:latin charset="0" pitchFamily="34" typeface="Arial"/>
-              </a:rPr>
-              <a:t/>
-            </a:r>
-          </a:p>
-          <a:p>
-            <a:pPr algn="l"/>
-            <a:r>
-              <a:rPr b="0" dirty="0" i="0" lang="en-US" smtClean="0" sz="2000" u="none">
-                <a:solidFill>
-                  <a:srgbClr val="000000"/>
-                </a:solidFill>
-                <a:latin charset="0" pitchFamily="34" typeface="Arial"/>
-              </a:rPr>
-              <a:t/>
-            </a:r>
-          </a:p>
-          <a:p>
-            <a:pPr algn="l"/>
-            <a:r>
-              <a:rPr b="0" dirty="0" i="0" lang="en-US" smtClean="0" sz="2000" u="none">
-                <a:solidFill>
-                  <a:srgbClr val="000000"/>
-                </a:solidFill>
-                <a:latin charset="0" pitchFamily="34" typeface="Arial"/>
+                <a:latin typeface="Arial" pitchFamily="34" charset="0"/>
               </a:rPr>
               <a:t>5.  A Strke is scored by adding 10 to the total number of pins knocked down in the next frame</a:t>
             </a:r>
           </a:p>
           <a:p>
             <a:pPr algn="l"/>
-            <a:r>
-              <a:rPr b="0" dirty="0" i="0" lang="en-US" smtClean="0" sz="3200" u="none">
-                <a:solidFill>
-                  <a:srgbClr val="000000"/>
-                </a:solidFill>
-                <a:latin charset="0" pitchFamily="34" typeface="Arial"/>
-              </a:rPr>
-              <a:t/>
-            </a:r>
+            <a:endParaRPr lang="en-US" sz="2000" b="0" i="0" u="none" dirty="0" smtClean="0">
+              <a:solidFill>
+                <a:srgbClr val="000000"/>
+              </a:solidFill>
+              <a:latin typeface="Arial" pitchFamily="34" charset="0"/>
+            </a:endParaRPr>
           </a:p>
           <a:p>
             <a:pPr algn="l"/>
+            <a:endParaRPr lang="en-US" sz="2000" b="0" i="0" u="none" dirty="0" smtClean="0">
+              <a:solidFill>
+                <a:srgbClr val="000000"/>
+              </a:solidFill>
+              <a:latin typeface="Arial" pitchFamily="34" charset="0"/>
+            </a:endParaRPr>
           </a:p>
         </p:txBody>
       </p:sp>
       <p:pic>
         <p:nvPicPr>
-          <p:cNvPr descr="photo.php?id=86812%2F7a4ff6cf7abf5c90f7af077d2673cae5" id="52" name="/ppt/media/"/>
-          <p:cNvPicPr>
-            <a:picLocks noChangeAspect="1"/>
-          </p:cNvPicPr>
-          <p:nvPr/>
-        </p:nvPicPr>
-        <p:blipFill>
-          <a:blip r:embed="rId1"/>
-          <a:stretch>
-            <a:fillRect/>
-          </a:stretch>
-        </p:blipFill>
-        <p:spPr>
-          <a:xfrm>
-            <a:off x="238125" y="3109913"/>
-            <a:ext cx="7143750" cy="714375"/>
-          </a:xfrm>
-          <a:prstGeom prst="rect"/>
-        </p:spPr>
-      </p:pic>
-      <p:pic>
-        <p:nvPicPr>
-          <p:cNvPr descr="photo.php?id=86812%2F58cd261e10eb048a8ff695e5571efd8a" id="53" name="/ppt/media/"/>
+          <p:cNvPr id="52" name="/ppt/media/" descr="photo.php?id=86812%2F7a4ff6cf7abf5c90f7af077d2673cae5"/>
           <p:cNvPicPr>
             <a:picLocks noChangeAspect="1"/>
           </p:cNvPicPr>
@@ -1800,10 +2071,36 @@
         </p:blipFill>
         <p:spPr>
           <a:xfrm>
+            <a:off x="238125" y="3238500"/>
+            <a:ext cx="7143750" cy="714375"/>
+          </a:xfrm>
+          <a:prstGeom prst="rect">
+            <a:avLst/>
+          </a:prstGeom>
+        </p:spPr>
+      </p:pic>
+      <p:pic>
+        <p:nvPicPr>
+          <p:cNvPr id="53" name="/ppt/media/" descr="photo.php?id=86812%2F58cd261e10eb048a8ff695e5571efd8a"/>
+          <p:cNvPicPr>
+            <a:picLocks noChangeAspect="1"/>
+          </p:cNvPicPr>
+          <p:nvPr/>
+        </p:nvPicPr>
+        <p:blipFill>
+          <a:blip r:embed="rId3"/>
+          <a:stretch>
+            <a:fillRect/>
+          </a:stretch>
+        </p:blipFill>
+        <p:spPr>
+          <a:xfrm>
             <a:off x="238125" y="4748213"/>
             <a:ext cx="7143750" cy="714375"/>
           </a:xfrm>
-          <a:prstGeom prst="rect"/>
+          <a:prstGeom prst="rect">
+            <a:avLst/>
+          </a:prstGeom>
         </p:spPr>
       </p:pic>
     </p:spTree>
@@ -2095,4 +2392,289 @@
   <a:objectDefaults/>
   <a:extraClrSchemeLst/>
 </a:theme>
+</file>
+
+<file path=ppt/theme/theme2.xml><?xml version="1.0" encoding="utf-8"?>
+<a:theme xmlns:a="http://schemas.openxmlformats.org/drawingml/2006/main" name="Office Theme">
+  <a:themeElements>
+    <a:clrScheme name="Office">
+      <a:dk1>
+        <a:sysClr val="windowText" lastClr="000000"/>
+      </a:dk1>
+      <a:lt1>
+        <a:sysClr val="window" lastClr="FFFFFF"/>
+      </a:lt1>
+      <a:dk2>
+        <a:srgbClr val="1F497D"/>
+      </a:dk2>
+      <a:lt2>
+        <a:srgbClr val="EEECE1"/>
+      </a:lt2>
+      <a:accent1>
+        <a:srgbClr val="4F81BD"/>
+      </a:accent1>
+      <a:accent2>
+        <a:srgbClr val="C0504D"/>
+      </a:accent2>
+      <a:accent3>
+        <a:srgbClr val="9BBB59"/>
+      </a:accent3>
+      <a:accent4>
+        <a:srgbClr val="8064A2"/>
+      </a:accent4>
+      <a:accent5>
+        <a:srgbClr val="4BACC6"/>
+      </a:accent5>
+      <a:accent6>
+        <a:srgbClr val="F79646"/>
+      </a:accent6>
+      <a:hlink>
+        <a:srgbClr val="0000FF"/>
+      </a:hlink>
+      <a:folHlink>
+        <a:srgbClr val="800080"/>
+      </a:folHlink>
+    </a:clrScheme>
+    <a:fontScheme name="Office">
+      <a:majorFont>
+        <a:latin typeface="Calibri"/>
+        <a:ea typeface=""/>
+        <a:cs typeface=""/>
+        <a:font script="Jpan" typeface="ＭＳ Ｐゴシック"/>
+        <a:font script="Hang" typeface="맑은 고딕"/>
+        <a:font script="Hans" typeface="宋体"/>
+        <a:font script="Hant" typeface="新細明體"/>
+        <a:font script="Arab" typeface="Times New Roman"/>
+        <a:font script="Hebr" typeface="Times New Roman"/>
+        <a:font script="Thai" typeface="Angsana New"/>
+        <a:font script="Ethi" typeface="Nyala"/>
+        <a:font script="Beng" typeface="Vrinda"/>
+        <a:font script="Gujr" typeface="Shruti"/>
+        <a:font script="Khmr" typeface="MoolBoran"/>
+        <a:font script="Knda" typeface="Tunga"/>
+        <a:font script="Guru" typeface="Raavi"/>
+        <a:font script="Cans" typeface="Euphemia"/>
+        <a:font script="Cher" typeface="Plantagenet Cherokee"/>
+        <a:font script="Yiii" typeface="Microsoft Yi Baiti"/>
+        <a:font script="Tibt" typeface="Microsoft Himalaya"/>
+        <a:font script="Thaa" typeface="MV Boli"/>
+        <a:font script="Deva" typeface="Mangal"/>
+        <a:font script="Telu" typeface="Gautami"/>
+        <a:font script="Taml" typeface="Latha"/>
+        <a:font script="Syrc" typeface="Estrangelo Edessa"/>
+        <a:font script="Orya" typeface="Kalinga"/>
+        <a:font script="Mlym" typeface="Kartika"/>
+        <a:font script="Laoo" typeface="DokChampa"/>
+        <a:font script="Sinh" typeface="Iskoola Pota"/>
+        <a:font script="Mong" typeface="Mongolian Baiti"/>
+        <a:font script="Viet" typeface="Times New Roman"/>
+        <a:font script="Uigh" typeface="Microsoft Uighur"/>
+        <a:font script="Geor" typeface="Sylfaen"/>
+      </a:majorFont>
+      <a:minorFont>
+        <a:latin typeface="Calibri"/>
+        <a:ea typeface=""/>
+        <a:cs typeface=""/>
+        <a:font script="Jpan" typeface="ＭＳ Ｐゴシック"/>
+        <a:font script="Hang" typeface="맑은 고딕"/>
+        <a:font script="Hans" typeface="宋体"/>
+        <a:font script="Hant" typeface="新細明體"/>
+        <a:font script="Arab" typeface="Arial"/>
+        <a:font script="Hebr" typeface="Arial"/>
+        <a:font script="Thai" typeface="Cordia New"/>
+        <a:font script="Ethi" typeface="Nyala"/>
+        <a:font script="Beng" typeface="Vrinda"/>
+        <a:font script="Gujr" typeface="Shruti"/>
+        <a:font script="Khmr" typeface="DaunPenh"/>
+        <a:font script="Knda" typeface="Tunga"/>
+        <a:font script="Guru" typeface="Raavi"/>
+        <a:font script="Cans" typeface="Euphemia"/>
+        <a:font script="Cher" typeface="Plantagenet Cherokee"/>
+        <a:font script="Yiii" typeface="Microsoft Yi Baiti"/>
+        <a:font script="Tibt" typeface="Microsoft Himalaya"/>
+        <a:font script="Thaa" typeface="MV Boli"/>
+        <a:font script="Deva" typeface="Mangal"/>
+        <a:font script="Telu" typeface="Gautami"/>
+        <a:font script="Taml" typeface="Latha"/>
+        <a:font script="Syrc" typeface="Estrangelo Edessa"/>
+        <a:font script="Orya" typeface="Kalinga"/>
+        <a:font script="Mlym" typeface="Kartika"/>
+        <a:font script="Laoo" typeface="DokChampa"/>
+        <a:font script="Sinh" typeface="Iskoola Pota"/>
+        <a:font script="Mong" typeface="Mongolian Baiti"/>
+        <a:font script="Viet" typeface="Arial"/>
+        <a:font script="Uigh" typeface="Microsoft Uighur"/>
+        <a:font script="Geor" typeface="Sylfaen"/>
+      </a:minorFont>
+    </a:fontScheme>
+    <a:fmtScheme name="Office">
+      <a:fillStyleLst>
+        <a:solidFill>
+          <a:schemeClr val="phClr"/>
+        </a:solidFill>
+        <a:gradFill rotWithShape="1">
+          <a:gsLst>
+            <a:gs pos="0">
+              <a:schemeClr val="phClr">
+                <a:tint val="50000"/>
+                <a:satMod val="300000"/>
+              </a:schemeClr>
+            </a:gs>
+            <a:gs pos="35000">
+              <a:schemeClr val="phClr">
+                <a:tint val="37000"/>
+                <a:satMod val="300000"/>
+              </a:schemeClr>
+            </a:gs>
+            <a:gs pos="100000">
+              <a:schemeClr val="phClr">
+                <a:tint val="15000"/>
+                <a:satMod val="350000"/>
+              </a:schemeClr>
+            </a:gs>
+          </a:gsLst>
+          <a:lin ang="16200000" scaled="1"/>
+        </a:gradFill>
+        <a:gradFill rotWithShape="1">
+          <a:gsLst>
+            <a:gs pos="0">
+              <a:schemeClr val="phClr">
+                <a:shade val="51000"/>
+                <a:satMod val="130000"/>
+              </a:schemeClr>
+            </a:gs>
+            <a:gs pos="80000">
+              <a:schemeClr val="phClr">
+                <a:shade val="93000"/>
+                <a:satMod val="130000"/>
+              </a:schemeClr>
+            </a:gs>
+            <a:gs pos="100000">
+              <a:schemeClr val="phClr">
+                <a:shade val="94000"/>
+                <a:satMod val="135000"/>
+              </a:schemeClr>
+            </a:gs>
+          </a:gsLst>
+          <a:lin ang="16200000" scaled="0"/>
+        </a:gradFill>
+      </a:fillStyleLst>
+      <a:lnStyleLst>
+        <a:ln w="9525" cap="flat" cmpd="sng" algn="ctr">
+          <a:solidFill>
+            <a:schemeClr val="phClr">
+              <a:shade val="95000"/>
+              <a:satMod val="105000"/>
+            </a:schemeClr>
+          </a:solidFill>
+          <a:prstDash val="solid"/>
+        </a:ln>
+        <a:ln w="25400" cap="flat" cmpd="sng" algn="ctr">
+          <a:solidFill>
+            <a:schemeClr val="phClr"/>
+          </a:solidFill>
+          <a:prstDash val="solid"/>
+        </a:ln>
+        <a:ln w="38100" cap="flat" cmpd="sng" algn="ctr">
+          <a:solidFill>
+            <a:schemeClr val="phClr"/>
+          </a:solidFill>
+          <a:prstDash val="solid"/>
+        </a:ln>
+      </a:lnStyleLst>
+      <a:effectStyleLst>
+        <a:effectStyle>
+          <a:effectLst>
+            <a:outerShdw blurRad="40000" dist="20000" dir="5400000" rotWithShape="0">
+              <a:srgbClr val="000000">
+                <a:alpha val="38000"/>
+              </a:srgbClr>
+            </a:outerShdw>
+          </a:effectLst>
+        </a:effectStyle>
+        <a:effectStyle>
+          <a:effectLst>
+            <a:outerShdw blurRad="40000" dist="23000" dir="5400000" rotWithShape="0">
+              <a:srgbClr val="000000">
+                <a:alpha val="35000"/>
+              </a:srgbClr>
+            </a:outerShdw>
+          </a:effectLst>
+        </a:effectStyle>
+        <a:effectStyle>
+          <a:effectLst>
+            <a:outerShdw blurRad="40000" dist="23000" dir="5400000" rotWithShape="0">
+              <a:srgbClr val="000000">
+                <a:alpha val="35000"/>
+              </a:srgbClr>
+            </a:outerShdw>
+          </a:effectLst>
+          <a:scene3d>
+            <a:camera prst="orthographicFront">
+              <a:rot lat="0" lon="0" rev="0"/>
+            </a:camera>
+            <a:lightRig rig="threePt" dir="t">
+              <a:rot lat="0" lon="0" rev="1200000"/>
+            </a:lightRig>
+          </a:scene3d>
+          <a:sp3d>
+            <a:bevelT w="63500" h="25400"/>
+          </a:sp3d>
+        </a:effectStyle>
+      </a:effectStyleLst>
+      <a:bgFillStyleLst>
+        <a:solidFill>
+          <a:schemeClr val="phClr"/>
+        </a:solidFill>
+        <a:gradFill rotWithShape="1">
+          <a:gsLst>
+            <a:gs pos="0">
+              <a:schemeClr val="phClr">
+                <a:tint val="40000"/>
+                <a:satMod val="350000"/>
+              </a:schemeClr>
+            </a:gs>
+            <a:gs pos="40000">
+              <a:schemeClr val="phClr">
+                <a:tint val="45000"/>
+                <a:shade val="99000"/>
+                <a:satMod val="350000"/>
+              </a:schemeClr>
+            </a:gs>
+            <a:gs pos="100000">
+              <a:schemeClr val="phClr">
+                <a:shade val="20000"/>
+                <a:satMod val="255000"/>
+              </a:schemeClr>
+            </a:gs>
+          </a:gsLst>
+          <a:path path="circle">
+            <a:fillToRect l="50000" t="-80000" r="50000" b="180000"/>
+          </a:path>
+        </a:gradFill>
+        <a:gradFill rotWithShape="1">
+          <a:gsLst>
+            <a:gs pos="0">
+              <a:schemeClr val="phClr">
+                <a:tint val="80000"/>
+                <a:satMod val="300000"/>
+              </a:schemeClr>
+            </a:gs>
+            <a:gs pos="100000">
+              <a:schemeClr val="phClr">
+                <a:shade val="30000"/>
+                <a:satMod val="200000"/>
+              </a:schemeClr>
+            </a:gs>
+          </a:gsLst>
+          <a:path path="circle">
+            <a:fillToRect l="50000" t="50000" r="50000" b="50000"/>
+          </a:path>
+        </a:gradFill>
+      </a:bgFillStyleLst>
+    </a:fmtScheme>
+  </a:themeElements>
+  <a:objectDefaults/>
+  <a:extraClrSchemeLst/>
+</a:theme>
 </file>
</xml_diff>